<commit_message>
Added a new pipelined xeng diagram to diagrams .pptx file. Updated pipelined_xeng.pdf with new diagram
</commit_message>
<xml_diff>
--- a/papers/initial_report/graphics/instrument_diagrams.pptx
+++ b/papers/initial_report/graphics/instrument_diagrams.pptx
@@ -8,7 +8,8 @@
     <p:sldId id="256" r:id="rId2"/>
     <p:sldId id="257" r:id="rId3"/>
     <p:sldId id="258" r:id="rId4"/>
-    <p:sldId id="259" r:id="rId5"/>
+    <p:sldId id="261" r:id="rId5"/>
+    <p:sldId id="260" r:id="rId6"/>
   </p:sldIdLst>
   <p:sldSz cx="9144000" cy="6858000" type="screen4x3"/>
   <p:notesSz cx="6858000" cy="9144000"/>
@@ -292,7 +293,7 @@
             <a:fld id="{00A040E2-248F-4AA9-A93C-939CA3D7B1E5}" type="datetimeFigureOut">
               <a:rPr lang="en-GB" smtClean="0"/>
               <a:pPr/>
-              <a:t>13/09/2011</a:t>
+              <a:t>28/03/2012</a:t>
             </a:fld>
             <a:endParaRPr lang="en-GB"/>
           </a:p>
@@ -459,7 +460,7 @@
             <a:fld id="{00A040E2-248F-4AA9-A93C-939CA3D7B1E5}" type="datetimeFigureOut">
               <a:rPr lang="en-GB" smtClean="0"/>
               <a:pPr/>
-              <a:t>13/09/2011</a:t>
+              <a:t>28/03/2012</a:t>
             </a:fld>
             <a:endParaRPr lang="en-GB"/>
           </a:p>
@@ -636,7 +637,7 @@
             <a:fld id="{00A040E2-248F-4AA9-A93C-939CA3D7B1E5}" type="datetimeFigureOut">
               <a:rPr lang="en-GB" smtClean="0"/>
               <a:pPr/>
-              <a:t>13/09/2011</a:t>
+              <a:t>28/03/2012</a:t>
             </a:fld>
             <a:endParaRPr lang="en-GB"/>
           </a:p>
@@ -803,7 +804,7 @@
             <a:fld id="{00A040E2-248F-4AA9-A93C-939CA3D7B1E5}" type="datetimeFigureOut">
               <a:rPr lang="en-GB" smtClean="0"/>
               <a:pPr/>
-              <a:t>13/09/2011</a:t>
+              <a:t>28/03/2012</a:t>
             </a:fld>
             <a:endParaRPr lang="en-GB"/>
           </a:p>
@@ -1046,7 +1047,7 @@
             <a:fld id="{00A040E2-248F-4AA9-A93C-939CA3D7B1E5}" type="datetimeFigureOut">
               <a:rPr lang="en-GB" smtClean="0"/>
               <a:pPr/>
-              <a:t>13/09/2011</a:t>
+              <a:t>28/03/2012</a:t>
             </a:fld>
             <a:endParaRPr lang="en-GB"/>
           </a:p>
@@ -1331,7 +1332,7 @@
             <a:fld id="{00A040E2-248F-4AA9-A93C-939CA3D7B1E5}" type="datetimeFigureOut">
               <a:rPr lang="en-GB" smtClean="0"/>
               <a:pPr/>
-              <a:t>13/09/2011</a:t>
+              <a:t>28/03/2012</a:t>
             </a:fld>
             <a:endParaRPr lang="en-GB"/>
           </a:p>
@@ -1750,7 +1751,7 @@
             <a:fld id="{00A040E2-248F-4AA9-A93C-939CA3D7B1E5}" type="datetimeFigureOut">
               <a:rPr lang="en-GB" smtClean="0"/>
               <a:pPr/>
-              <a:t>13/09/2011</a:t>
+              <a:t>28/03/2012</a:t>
             </a:fld>
             <a:endParaRPr lang="en-GB"/>
           </a:p>
@@ -1865,7 +1866,7 @@
             <a:fld id="{00A040E2-248F-4AA9-A93C-939CA3D7B1E5}" type="datetimeFigureOut">
               <a:rPr lang="en-GB" smtClean="0"/>
               <a:pPr/>
-              <a:t>13/09/2011</a:t>
+              <a:t>28/03/2012</a:t>
             </a:fld>
             <a:endParaRPr lang="en-GB"/>
           </a:p>
@@ -1957,7 +1958,7 @@
             <a:fld id="{00A040E2-248F-4AA9-A93C-939CA3D7B1E5}" type="datetimeFigureOut">
               <a:rPr lang="en-GB" smtClean="0"/>
               <a:pPr/>
-              <a:t>13/09/2011</a:t>
+              <a:t>28/03/2012</a:t>
             </a:fld>
             <a:endParaRPr lang="en-GB"/>
           </a:p>
@@ -2231,7 +2232,7 @@
             <a:fld id="{00A040E2-248F-4AA9-A93C-939CA3D7B1E5}" type="datetimeFigureOut">
               <a:rPr lang="en-GB" smtClean="0"/>
               <a:pPr/>
-              <a:t>13/09/2011</a:t>
+              <a:t>28/03/2012</a:t>
             </a:fld>
             <a:endParaRPr lang="en-GB"/>
           </a:p>
@@ -2481,7 +2482,7 @@
             <a:fld id="{00A040E2-248F-4AA9-A93C-939CA3D7B1E5}" type="datetimeFigureOut">
               <a:rPr lang="en-GB" smtClean="0"/>
               <a:pPr/>
-              <a:t>13/09/2011</a:t>
+              <a:t>28/03/2012</a:t>
             </a:fld>
             <a:endParaRPr lang="en-GB"/>
           </a:p>
@@ -2691,7 +2692,7 @@
             <a:fld id="{00A040E2-248F-4AA9-A93C-939CA3D7B1E5}" type="datetimeFigureOut">
               <a:rPr lang="en-GB" smtClean="0"/>
               <a:pPr/>
-              <a:t>13/09/2011</a:t>
+              <a:t>28/03/2012</a:t>
             </a:fld>
             <a:endParaRPr lang="en-GB"/>
           </a:p>
@@ -14258,10 +14259,3515 @@
         </p:txBody>
       </p:sp>
     </p:spTree>
+    <p:extLst>
+      <p:ext uri="{BB962C8B-B14F-4D97-AF65-F5344CB8AC3E}">
+        <p14:creationId xmlns:p14="http://schemas.microsoft.com/office/powerpoint/2010/main" val="675350171"/>
+      </p:ext>
+    </p:extLst>
   </p:cSld>
   <p:clrMapOvr>
     <a:masterClrMapping/>
   </p:clrMapOvr>
+</p:sld>
+</file>
+
+<file path=ppt/slides/slide5.xml><?xml version="1.0" encoding="utf-8"?>
+<p:sld xmlns:a="http://schemas.openxmlformats.org/drawingml/2006/main" xmlns:r="http://schemas.openxmlformats.org/officeDocument/2006/relationships" xmlns:p="http://schemas.openxmlformats.org/presentationml/2006/main">
+  <p:cSld>
+    <p:spTree>
+      <p:nvGrpSpPr>
+        <p:cNvPr id="1" name=""/>
+        <p:cNvGrpSpPr/>
+        <p:nvPr/>
+      </p:nvGrpSpPr>
+      <p:grpSpPr>
+        <a:xfrm>
+          <a:off x="0" y="0"/>
+          <a:ext cx="0" cy="0"/>
+          <a:chOff x="0" y="0"/>
+          <a:chExt cx="0" cy="0"/>
+        </a:xfrm>
+      </p:grpSpPr>
+      <p:sp>
+        <p:nvSpPr>
+          <p:cNvPr id="6" name="Oval 5"/>
+          <p:cNvSpPr/>
+          <p:nvPr/>
+        </p:nvSpPr>
+        <p:spPr>
+          <a:xfrm>
+            <a:off x="1391507" y="3091943"/>
+            <a:ext cx="245660" cy="245660"/>
+          </a:xfrm>
+          <a:prstGeom prst="ellipse">
+            <a:avLst/>
+          </a:prstGeom>
+          <a:solidFill>
+            <a:schemeClr val="bg1"/>
+          </a:solidFill>
+          <a:ln w="9525">
+            <a:solidFill>
+              <a:schemeClr val="tx1"/>
+            </a:solidFill>
+          </a:ln>
+        </p:spPr>
+        <p:style>
+          <a:lnRef idx="2">
+            <a:schemeClr val="accent1">
+              <a:shade val="50000"/>
+            </a:schemeClr>
+          </a:lnRef>
+          <a:fillRef idx="1">
+            <a:schemeClr val="accent1"/>
+          </a:fillRef>
+          <a:effectRef idx="0">
+            <a:schemeClr val="accent1"/>
+          </a:effectRef>
+          <a:fontRef idx="minor">
+            <a:schemeClr val="lt1"/>
+          </a:fontRef>
+        </p:style>
+        <p:txBody>
+          <a:bodyPr rtlCol="0" anchor="ctr"/>
+          <a:lstStyle/>
+          <a:p>
+            <a:pPr algn="ctr"/>
+            <a:endParaRPr lang="en-GB"/>
+          </a:p>
+        </p:txBody>
+      </p:sp>
+      <p:cxnSp>
+        <p:nvCxnSpPr>
+          <p:cNvPr id="9" name="Straight Connector 8"/>
+          <p:cNvCxnSpPr>
+            <a:stCxn id="6" idx="1"/>
+            <a:endCxn id="6" idx="5"/>
+          </p:cNvCxnSpPr>
+          <p:nvPr/>
+        </p:nvCxnSpPr>
+        <p:spPr>
+          <a:xfrm rot="16200000" flipH="1">
+            <a:off x="1427483" y="3127919"/>
+            <a:ext cx="173708" cy="173708"/>
+          </a:xfrm>
+          <a:prstGeom prst="line">
+            <a:avLst/>
+          </a:prstGeom>
+          <a:ln w="12700">
+            <a:solidFill>
+              <a:schemeClr val="tx1"/>
+            </a:solidFill>
+          </a:ln>
+        </p:spPr>
+        <p:style>
+          <a:lnRef idx="1">
+            <a:schemeClr val="accent1"/>
+          </a:lnRef>
+          <a:fillRef idx="0">
+            <a:schemeClr val="accent1"/>
+          </a:fillRef>
+          <a:effectRef idx="0">
+            <a:schemeClr val="accent1"/>
+          </a:effectRef>
+          <a:fontRef idx="minor">
+            <a:schemeClr val="tx1"/>
+          </a:fontRef>
+        </p:style>
+      </p:cxnSp>
+      <p:cxnSp>
+        <p:nvCxnSpPr>
+          <p:cNvPr id="10" name="Straight Connector 9"/>
+          <p:cNvCxnSpPr>
+            <a:stCxn id="6" idx="7"/>
+            <a:endCxn id="6" idx="3"/>
+          </p:cNvCxnSpPr>
+          <p:nvPr/>
+        </p:nvCxnSpPr>
+        <p:spPr>
+          <a:xfrm rot="16200000" flipH="1" flipV="1">
+            <a:off x="1427483" y="3127919"/>
+            <a:ext cx="173708" cy="173708"/>
+          </a:xfrm>
+          <a:prstGeom prst="line">
+            <a:avLst/>
+          </a:prstGeom>
+          <a:ln w="12700">
+            <a:solidFill>
+              <a:schemeClr val="tx1"/>
+            </a:solidFill>
+          </a:ln>
+        </p:spPr>
+        <p:style>
+          <a:lnRef idx="1">
+            <a:schemeClr val="accent1"/>
+          </a:lnRef>
+          <a:fillRef idx="0">
+            <a:schemeClr val="accent1"/>
+          </a:fillRef>
+          <a:effectRef idx="0">
+            <a:schemeClr val="accent1"/>
+          </a:effectRef>
+          <a:fontRef idx="minor">
+            <a:schemeClr val="tx1"/>
+          </a:fontRef>
+        </p:style>
+      </p:cxnSp>
+      <p:cxnSp>
+        <p:nvCxnSpPr>
+          <p:cNvPr id="11" name="Elbow Connector 10"/>
+          <p:cNvCxnSpPr>
+            <a:stCxn id="6" idx="6"/>
+            <a:endCxn id="12" idx="0"/>
+          </p:cNvCxnSpPr>
+          <p:nvPr/>
+        </p:nvCxnSpPr>
+        <p:spPr>
+          <a:xfrm>
+            <a:off x="1637167" y="3214773"/>
+            <a:ext cx="330258" cy="597250"/>
+          </a:xfrm>
+          <a:prstGeom prst="bentConnector2">
+            <a:avLst/>
+          </a:prstGeom>
+          <a:ln>
+            <a:solidFill>
+              <a:schemeClr val="tx1"/>
+            </a:solidFill>
+            <a:tailEnd type="stealth"/>
+          </a:ln>
+        </p:spPr>
+        <p:style>
+          <a:lnRef idx="1">
+            <a:schemeClr val="accent1"/>
+          </a:lnRef>
+          <a:fillRef idx="0">
+            <a:schemeClr val="accent1"/>
+          </a:fillRef>
+          <a:effectRef idx="0">
+            <a:schemeClr val="accent1"/>
+          </a:effectRef>
+          <a:fontRef idx="minor">
+            <a:schemeClr val="tx1"/>
+          </a:fontRef>
+        </p:style>
+      </p:cxnSp>
+      <p:sp>
+        <p:nvSpPr>
+          <p:cNvPr id="12" name="Rectangle 11"/>
+          <p:cNvSpPr/>
+          <p:nvPr/>
+        </p:nvSpPr>
+        <p:spPr>
+          <a:xfrm>
+            <a:off x="1805407" y="3812023"/>
+            <a:ext cx="324036" cy="369332"/>
+          </a:xfrm>
+          <a:prstGeom prst="rect">
+            <a:avLst/>
+          </a:prstGeom>
+          <a:solidFill>
+            <a:schemeClr val="bg1"/>
+          </a:solidFill>
+          <a:ln w="9525">
+            <a:solidFill>
+              <a:schemeClr val="tx1"/>
+            </a:solidFill>
+          </a:ln>
+        </p:spPr>
+        <p:style>
+          <a:lnRef idx="2">
+            <a:schemeClr val="accent1">
+              <a:shade val="50000"/>
+            </a:schemeClr>
+          </a:lnRef>
+          <a:fillRef idx="1">
+            <a:schemeClr val="accent1"/>
+          </a:fillRef>
+          <a:effectRef idx="0">
+            <a:schemeClr val="accent1"/>
+          </a:effectRef>
+          <a:fontRef idx="minor">
+            <a:schemeClr val="lt1"/>
+          </a:fontRef>
+        </p:style>
+        <p:txBody>
+          <a:bodyPr rtlCol="0" anchor="ctr"/>
+          <a:lstStyle/>
+          <a:p>
+            <a:pPr algn="ctr"/>
+            <a:endParaRPr lang="en-GB"/>
+          </a:p>
+        </p:txBody>
+      </p:sp>
+      <p:sp>
+        <p:nvSpPr>
+          <p:cNvPr id="13" name="TextBox 12"/>
+          <p:cNvSpPr txBox="1"/>
+          <p:nvPr/>
+        </p:nvSpPr>
+        <p:spPr>
+          <a:xfrm>
+            <a:off x="1819724" y="3830031"/>
+            <a:ext cx="301686" cy="400110"/>
+          </a:xfrm>
+          <a:prstGeom prst="rect">
+            <a:avLst/>
+          </a:prstGeom>
+          <a:noFill/>
+        </p:spPr>
+        <p:txBody>
+          <a:bodyPr wrap="none" rtlCol="0">
+            <a:spAutoFit/>
+          </a:bodyPr>
+          <a:lstStyle/>
+          <a:p>
+            <a:r>
+              <a:rPr lang="el-GR" sz="2000" dirty="0" smtClean="0"/>
+              <a:t>Σ</a:t>
+            </a:r>
+            <a:endParaRPr lang="en-GB" sz="2000" dirty="0"/>
+          </a:p>
+        </p:txBody>
+      </p:sp>
+      <p:sp>
+        <p:nvSpPr>
+          <p:cNvPr id="14" name="Oval 13"/>
+          <p:cNvSpPr/>
+          <p:nvPr/>
+        </p:nvSpPr>
+        <p:spPr>
+          <a:xfrm>
+            <a:off x="3339107" y="3091943"/>
+            <a:ext cx="245660" cy="245660"/>
+          </a:xfrm>
+          <a:prstGeom prst="ellipse">
+            <a:avLst/>
+          </a:prstGeom>
+          <a:solidFill>
+            <a:schemeClr val="bg1"/>
+          </a:solidFill>
+          <a:ln w="9525">
+            <a:solidFill>
+              <a:schemeClr val="tx1"/>
+            </a:solidFill>
+          </a:ln>
+        </p:spPr>
+        <p:style>
+          <a:lnRef idx="2">
+            <a:schemeClr val="accent1">
+              <a:shade val="50000"/>
+            </a:schemeClr>
+          </a:lnRef>
+          <a:fillRef idx="1">
+            <a:schemeClr val="accent1"/>
+          </a:fillRef>
+          <a:effectRef idx="0">
+            <a:schemeClr val="accent1"/>
+          </a:effectRef>
+          <a:fontRef idx="minor">
+            <a:schemeClr val="lt1"/>
+          </a:fontRef>
+        </p:style>
+        <p:txBody>
+          <a:bodyPr rtlCol="0" anchor="ctr"/>
+          <a:lstStyle/>
+          <a:p>
+            <a:pPr algn="ctr"/>
+            <a:endParaRPr lang="en-GB"/>
+          </a:p>
+        </p:txBody>
+      </p:sp>
+      <p:cxnSp>
+        <p:nvCxnSpPr>
+          <p:cNvPr id="15" name="Straight Connector 14"/>
+          <p:cNvCxnSpPr>
+            <a:stCxn id="14" idx="1"/>
+            <a:endCxn id="14" idx="5"/>
+          </p:cNvCxnSpPr>
+          <p:nvPr/>
+        </p:nvCxnSpPr>
+        <p:spPr>
+          <a:xfrm rot="16200000" flipH="1">
+            <a:off x="3375083" y="3127919"/>
+            <a:ext cx="173708" cy="173708"/>
+          </a:xfrm>
+          <a:prstGeom prst="line">
+            <a:avLst/>
+          </a:prstGeom>
+          <a:ln w="12700">
+            <a:solidFill>
+              <a:schemeClr val="tx1"/>
+            </a:solidFill>
+          </a:ln>
+        </p:spPr>
+        <p:style>
+          <a:lnRef idx="1">
+            <a:schemeClr val="accent1"/>
+          </a:lnRef>
+          <a:fillRef idx="0">
+            <a:schemeClr val="accent1"/>
+          </a:fillRef>
+          <a:effectRef idx="0">
+            <a:schemeClr val="accent1"/>
+          </a:effectRef>
+          <a:fontRef idx="minor">
+            <a:schemeClr val="tx1"/>
+          </a:fontRef>
+        </p:style>
+      </p:cxnSp>
+      <p:cxnSp>
+        <p:nvCxnSpPr>
+          <p:cNvPr id="16" name="Straight Connector 15"/>
+          <p:cNvCxnSpPr>
+            <a:stCxn id="14" idx="7"/>
+            <a:endCxn id="14" idx="3"/>
+          </p:cNvCxnSpPr>
+          <p:nvPr/>
+        </p:nvCxnSpPr>
+        <p:spPr>
+          <a:xfrm rot="16200000" flipH="1" flipV="1">
+            <a:off x="3375083" y="3127919"/>
+            <a:ext cx="173708" cy="173708"/>
+          </a:xfrm>
+          <a:prstGeom prst="line">
+            <a:avLst/>
+          </a:prstGeom>
+          <a:ln w="12700">
+            <a:solidFill>
+              <a:schemeClr val="tx1"/>
+            </a:solidFill>
+          </a:ln>
+        </p:spPr>
+        <p:style>
+          <a:lnRef idx="1">
+            <a:schemeClr val="accent1"/>
+          </a:lnRef>
+          <a:fillRef idx="0">
+            <a:schemeClr val="accent1"/>
+          </a:fillRef>
+          <a:effectRef idx="0">
+            <a:schemeClr val="accent1"/>
+          </a:effectRef>
+          <a:fontRef idx="minor">
+            <a:schemeClr val="tx1"/>
+          </a:fontRef>
+        </p:style>
+      </p:cxnSp>
+      <p:sp>
+        <p:nvSpPr>
+          <p:cNvPr id="18" name="Rectangle 17"/>
+          <p:cNvSpPr/>
+          <p:nvPr/>
+        </p:nvSpPr>
+        <p:spPr>
+          <a:xfrm>
+            <a:off x="2781131" y="2360021"/>
+            <a:ext cx="533720" cy="216024"/>
+          </a:xfrm>
+          <a:prstGeom prst="rect">
+            <a:avLst/>
+          </a:prstGeom>
+          <a:solidFill>
+            <a:schemeClr val="bg1"/>
+          </a:solidFill>
+          <a:ln w="9525">
+            <a:solidFill>
+              <a:schemeClr val="tx1"/>
+            </a:solidFill>
+          </a:ln>
+        </p:spPr>
+        <p:style>
+          <a:lnRef idx="2">
+            <a:schemeClr val="accent1">
+              <a:shade val="50000"/>
+            </a:schemeClr>
+          </a:lnRef>
+          <a:fillRef idx="1">
+            <a:schemeClr val="accent1"/>
+          </a:fillRef>
+          <a:effectRef idx="0">
+            <a:schemeClr val="accent1"/>
+          </a:effectRef>
+          <a:fontRef idx="minor">
+            <a:schemeClr val="lt1"/>
+          </a:fontRef>
+        </p:style>
+        <p:txBody>
+          <a:bodyPr rtlCol="0" anchor="ctr"/>
+          <a:lstStyle/>
+          <a:p>
+            <a:pPr algn="ctr"/>
+            <a:endParaRPr lang="en-GB"/>
+          </a:p>
+        </p:txBody>
+      </p:sp>
+      <p:sp>
+        <p:nvSpPr>
+          <p:cNvPr id="19" name="TextBox 18"/>
+          <p:cNvSpPr txBox="1"/>
+          <p:nvPr/>
+        </p:nvSpPr>
+        <p:spPr>
+          <a:xfrm>
+            <a:off x="2877635" y="2311080"/>
+            <a:ext cx="369012" cy="307777"/>
+          </a:xfrm>
+          <a:prstGeom prst="rect">
+            <a:avLst/>
+          </a:prstGeom>
+          <a:noFill/>
+        </p:spPr>
+        <p:txBody>
+          <a:bodyPr wrap="none" rtlCol="0">
+            <a:spAutoFit/>
+          </a:bodyPr>
+          <a:lstStyle/>
+          <a:p>
+            <a:r>
+              <a:rPr lang="en-US" sz="1400" dirty="0" smtClean="0"/>
+              <a:t>z</a:t>
+            </a:r>
+            <a:r>
+              <a:rPr lang="en-US" sz="1400" baseline="30000" dirty="0" smtClean="0"/>
+              <a:t>-N</a:t>
+            </a:r>
+            <a:endParaRPr lang="en-GB" sz="1400" baseline="30000" dirty="0"/>
+          </a:p>
+        </p:txBody>
+      </p:sp>
+      <p:cxnSp>
+        <p:nvCxnSpPr>
+          <p:cNvPr id="20" name="Straight Connector 19"/>
+          <p:cNvCxnSpPr>
+            <a:endCxn id="18" idx="1"/>
+          </p:cNvCxnSpPr>
+          <p:nvPr/>
+        </p:nvCxnSpPr>
+        <p:spPr>
+          <a:xfrm>
+            <a:off x="1514337" y="2465993"/>
+            <a:ext cx="1266794" cy="2040"/>
+          </a:xfrm>
+          <a:prstGeom prst="line">
+            <a:avLst/>
+          </a:prstGeom>
+          <a:ln>
+            <a:solidFill>
+              <a:schemeClr val="tx1"/>
+            </a:solidFill>
+            <a:tailEnd type="stealth"/>
+          </a:ln>
+        </p:spPr>
+        <p:style>
+          <a:lnRef idx="1">
+            <a:schemeClr val="accent1"/>
+          </a:lnRef>
+          <a:fillRef idx="0">
+            <a:schemeClr val="accent1"/>
+          </a:fillRef>
+          <a:effectRef idx="0">
+            <a:schemeClr val="accent1"/>
+          </a:effectRef>
+          <a:fontRef idx="minor">
+            <a:schemeClr val="tx1"/>
+          </a:fontRef>
+        </p:style>
+      </p:cxnSp>
+      <p:cxnSp>
+        <p:nvCxnSpPr>
+          <p:cNvPr id="25" name="Elbow Connector 10"/>
+          <p:cNvCxnSpPr>
+            <a:stCxn id="14" idx="6"/>
+            <a:endCxn id="107" idx="0"/>
+          </p:cNvCxnSpPr>
+          <p:nvPr/>
+        </p:nvCxnSpPr>
+        <p:spPr>
+          <a:xfrm>
+            <a:off x="3584767" y="3214773"/>
+            <a:ext cx="116370" cy="582358"/>
+          </a:xfrm>
+          <a:prstGeom prst="bentConnector2">
+            <a:avLst/>
+          </a:prstGeom>
+          <a:ln>
+            <a:solidFill>
+              <a:schemeClr val="tx1"/>
+            </a:solidFill>
+            <a:tailEnd type="stealth"/>
+          </a:ln>
+        </p:spPr>
+        <p:style>
+          <a:lnRef idx="1">
+            <a:schemeClr val="accent1"/>
+          </a:lnRef>
+          <a:fillRef idx="0">
+            <a:schemeClr val="accent1"/>
+          </a:fillRef>
+          <a:effectRef idx="0">
+            <a:schemeClr val="accent1"/>
+          </a:effectRef>
+          <a:fontRef idx="minor">
+            <a:schemeClr val="tx1"/>
+          </a:fontRef>
+        </p:style>
+      </p:cxnSp>
+      <p:sp>
+        <p:nvSpPr>
+          <p:cNvPr id="26" name="Rectangle 25"/>
+          <p:cNvSpPr/>
+          <p:nvPr/>
+        </p:nvSpPr>
+        <p:spPr>
+          <a:xfrm>
+            <a:off x="3539119" y="3812023"/>
+            <a:ext cx="324036" cy="369332"/>
+          </a:xfrm>
+          <a:prstGeom prst="rect">
+            <a:avLst/>
+          </a:prstGeom>
+          <a:solidFill>
+            <a:schemeClr val="bg1"/>
+          </a:solidFill>
+          <a:ln w="9525">
+            <a:solidFill>
+              <a:schemeClr val="tx1"/>
+            </a:solidFill>
+          </a:ln>
+        </p:spPr>
+        <p:style>
+          <a:lnRef idx="2">
+            <a:schemeClr val="accent1">
+              <a:shade val="50000"/>
+            </a:schemeClr>
+          </a:lnRef>
+          <a:fillRef idx="1">
+            <a:schemeClr val="accent1"/>
+          </a:fillRef>
+          <a:effectRef idx="0">
+            <a:schemeClr val="accent1"/>
+          </a:effectRef>
+          <a:fontRef idx="minor">
+            <a:schemeClr val="lt1"/>
+          </a:fontRef>
+        </p:style>
+        <p:txBody>
+          <a:bodyPr rtlCol="0" anchor="ctr"/>
+          <a:lstStyle/>
+          <a:p>
+            <a:pPr algn="ctr"/>
+            <a:endParaRPr lang="en-GB"/>
+          </a:p>
+        </p:txBody>
+      </p:sp>
+      <p:cxnSp>
+        <p:nvCxnSpPr>
+          <p:cNvPr id="38" name="Straight Connector 37"/>
+          <p:cNvCxnSpPr>
+            <a:stCxn id="18" idx="3"/>
+          </p:cNvCxnSpPr>
+          <p:nvPr/>
+        </p:nvCxnSpPr>
+        <p:spPr>
+          <a:xfrm>
+            <a:off x="3314851" y="2468033"/>
+            <a:ext cx="962915" cy="0"/>
+          </a:xfrm>
+          <a:prstGeom prst="line">
+            <a:avLst/>
+          </a:prstGeom>
+          <a:ln>
+            <a:solidFill>
+              <a:schemeClr val="tx1"/>
+            </a:solidFill>
+            <a:tailEnd type="stealth"/>
+          </a:ln>
+        </p:spPr>
+        <p:style>
+          <a:lnRef idx="1">
+            <a:schemeClr val="accent1"/>
+          </a:lnRef>
+          <a:fillRef idx="0">
+            <a:schemeClr val="accent1"/>
+          </a:fillRef>
+          <a:effectRef idx="0">
+            <a:schemeClr val="accent1"/>
+          </a:effectRef>
+          <a:fontRef idx="minor">
+            <a:schemeClr val="tx1"/>
+          </a:fontRef>
+        </p:style>
+      </p:cxnSp>
+      <p:cxnSp>
+        <p:nvCxnSpPr>
+          <p:cNvPr id="39" name="Straight Connector 38"/>
+          <p:cNvCxnSpPr/>
+          <p:nvPr/>
+        </p:nvCxnSpPr>
+        <p:spPr>
+          <a:xfrm>
+            <a:off x="1967425" y="4490573"/>
+            <a:ext cx="3486876" cy="8722"/>
+          </a:xfrm>
+          <a:prstGeom prst="line">
+            <a:avLst/>
+          </a:prstGeom>
+          <a:ln>
+            <a:solidFill>
+              <a:schemeClr val="tx1"/>
+            </a:solidFill>
+            <a:headEnd type="none"/>
+            <a:tailEnd type="stealth"/>
+          </a:ln>
+        </p:spPr>
+        <p:style>
+          <a:lnRef idx="1">
+            <a:schemeClr val="accent1"/>
+          </a:lnRef>
+          <a:fillRef idx="0">
+            <a:schemeClr val="accent1"/>
+          </a:fillRef>
+          <a:effectRef idx="0">
+            <a:schemeClr val="accent1"/>
+          </a:effectRef>
+          <a:fontRef idx="minor">
+            <a:schemeClr val="tx1"/>
+          </a:fontRef>
+        </p:style>
+      </p:cxnSp>
+      <p:cxnSp>
+        <p:nvCxnSpPr>
+          <p:cNvPr id="42" name="Straight Connector 41"/>
+          <p:cNvCxnSpPr>
+            <a:stCxn id="331" idx="2"/>
+          </p:cNvCxnSpPr>
+          <p:nvPr/>
+        </p:nvCxnSpPr>
+        <p:spPr>
+          <a:xfrm>
+            <a:off x="5207892" y="4183407"/>
+            <a:ext cx="0" cy="315888"/>
+          </a:xfrm>
+          <a:prstGeom prst="line">
+            <a:avLst/>
+          </a:prstGeom>
+          <a:ln>
+            <a:solidFill>
+              <a:schemeClr val="tx1"/>
+            </a:solidFill>
+            <a:headEnd type="none"/>
+            <a:tailEnd type="stealth"/>
+          </a:ln>
+        </p:spPr>
+        <p:style>
+          <a:lnRef idx="1">
+            <a:schemeClr val="accent1"/>
+          </a:lnRef>
+          <a:fillRef idx="0">
+            <a:schemeClr val="accent1"/>
+          </a:fillRef>
+          <a:effectRef idx="0">
+            <a:schemeClr val="accent1"/>
+          </a:effectRef>
+          <a:fontRef idx="minor">
+            <a:schemeClr val="tx1"/>
+          </a:fontRef>
+        </p:style>
+      </p:cxnSp>
+      <p:cxnSp>
+        <p:nvCxnSpPr>
+          <p:cNvPr id="43" name="Straight Connector 42"/>
+          <p:cNvCxnSpPr/>
+          <p:nvPr/>
+        </p:nvCxnSpPr>
+        <p:spPr>
+          <a:xfrm>
+            <a:off x="5490257" y="3523991"/>
+            <a:ext cx="726669" cy="0"/>
+          </a:xfrm>
+          <a:prstGeom prst="line">
+            <a:avLst/>
+          </a:prstGeom>
+          <a:ln>
+            <a:solidFill>
+              <a:schemeClr val="tx1"/>
+            </a:solidFill>
+            <a:prstDash val="lgDash"/>
+          </a:ln>
+        </p:spPr>
+        <p:style>
+          <a:lnRef idx="1">
+            <a:schemeClr val="accent1"/>
+          </a:lnRef>
+          <a:fillRef idx="0">
+            <a:schemeClr val="accent1"/>
+          </a:fillRef>
+          <a:effectRef idx="0">
+            <a:schemeClr val="accent1"/>
+          </a:effectRef>
+          <a:fontRef idx="minor">
+            <a:schemeClr val="tx1"/>
+          </a:fontRef>
+        </p:style>
+      </p:cxnSp>
+      <p:cxnSp>
+        <p:nvCxnSpPr>
+          <p:cNvPr id="44" name="Straight Connector 43"/>
+          <p:cNvCxnSpPr/>
+          <p:nvPr/>
+        </p:nvCxnSpPr>
+        <p:spPr>
+          <a:xfrm>
+            <a:off x="5496941" y="2465993"/>
+            <a:ext cx="726669" cy="0"/>
+          </a:xfrm>
+          <a:prstGeom prst="line">
+            <a:avLst/>
+          </a:prstGeom>
+          <a:ln>
+            <a:solidFill>
+              <a:schemeClr val="tx1"/>
+            </a:solidFill>
+            <a:prstDash val="lgDash"/>
+          </a:ln>
+        </p:spPr>
+        <p:style>
+          <a:lnRef idx="1">
+            <a:schemeClr val="accent1"/>
+          </a:lnRef>
+          <a:fillRef idx="0">
+            <a:schemeClr val="accent1"/>
+          </a:fillRef>
+          <a:effectRef idx="0">
+            <a:schemeClr val="accent1"/>
+          </a:effectRef>
+          <a:fontRef idx="minor">
+            <a:schemeClr val="tx1"/>
+          </a:fontRef>
+        </p:style>
+      </p:cxnSp>
+      <p:cxnSp>
+        <p:nvCxnSpPr>
+          <p:cNvPr id="45" name="Straight Connector 44"/>
+          <p:cNvCxnSpPr/>
+          <p:nvPr/>
+        </p:nvCxnSpPr>
+        <p:spPr>
+          <a:xfrm>
+            <a:off x="5516993" y="4490573"/>
+            <a:ext cx="726669" cy="0"/>
+          </a:xfrm>
+          <a:prstGeom prst="line">
+            <a:avLst/>
+          </a:prstGeom>
+          <a:ln>
+            <a:solidFill>
+              <a:schemeClr val="tx1"/>
+            </a:solidFill>
+            <a:prstDash val="lgDash"/>
+          </a:ln>
+        </p:spPr>
+        <p:style>
+          <a:lnRef idx="1">
+            <a:schemeClr val="accent1"/>
+          </a:lnRef>
+          <a:fillRef idx="0">
+            <a:schemeClr val="accent1"/>
+          </a:fillRef>
+          <a:effectRef idx="0">
+            <a:schemeClr val="accent1"/>
+          </a:effectRef>
+          <a:fontRef idx="minor">
+            <a:schemeClr val="tx1"/>
+          </a:fontRef>
+        </p:style>
+      </p:cxnSp>
+      <p:cxnSp>
+        <p:nvCxnSpPr>
+          <p:cNvPr id="58" name="Straight Connector 57"/>
+          <p:cNvCxnSpPr/>
+          <p:nvPr/>
+        </p:nvCxnSpPr>
+        <p:spPr>
+          <a:xfrm flipV="1">
+            <a:off x="6311239" y="4486155"/>
+            <a:ext cx="2251235" cy="4418"/>
+          </a:xfrm>
+          <a:prstGeom prst="line">
+            <a:avLst/>
+          </a:prstGeom>
+          <a:ln>
+            <a:solidFill>
+              <a:schemeClr val="tx1"/>
+            </a:solidFill>
+            <a:tailEnd type="stealth"/>
+          </a:ln>
+        </p:spPr>
+        <p:style>
+          <a:lnRef idx="1">
+            <a:schemeClr val="accent1"/>
+          </a:lnRef>
+          <a:fillRef idx="0">
+            <a:schemeClr val="accent1"/>
+          </a:fillRef>
+          <a:effectRef idx="0">
+            <a:schemeClr val="accent1"/>
+          </a:effectRef>
+          <a:fontRef idx="minor">
+            <a:schemeClr val="tx1"/>
+          </a:fontRef>
+        </p:style>
+      </p:cxnSp>
+      <p:cxnSp>
+        <p:nvCxnSpPr>
+          <p:cNvPr id="63" name="Elbow Connector 10"/>
+          <p:cNvCxnSpPr>
+            <a:stCxn id="359" idx="3"/>
+          </p:cNvCxnSpPr>
+          <p:nvPr/>
+        </p:nvCxnSpPr>
+        <p:spPr>
+          <a:xfrm flipH="1" flipV="1">
+            <a:off x="616333" y="1744580"/>
+            <a:ext cx="6446067" cy="715525"/>
+          </a:xfrm>
+          <a:prstGeom prst="bentConnector3">
+            <a:avLst>
+              <a:gd name="adj1" fmla="val -14330"/>
+            </a:avLst>
+          </a:prstGeom>
+          <a:ln>
+            <a:solidFill>
+              <a:schemeClr val="tx1"/>
+            </a:solidFill>
+            <a:tailEnd type="none"/>
+          </a:ln>
+        </p:spPr>
+        <p:style>
+          <a:lnRef idx="1">
+            <a:schemeClr val="accent1"/>
+          </a:lnRef>
+          <a:fillRef idx="0">
+            <a:schemeClr val="accent1"/>
+          </a:fillRef>
+          <a:effectRef idx="0">
+            <a:schemeClr val="accent1"/>
+          </a:effectRef>
+          <a:fontRef idx="minor">
+            <a:schemeClr val="tx1"/>
+          </a:fontRef>
+        </p:style>
+      </p:cxnSp>
+      <p:sp>
+        <p:nvSpPr>
+          <p:cNvPr id="94" name="Rectangle 93"/>
+          <p:cNvSpPr/>
+          <p:nvPr/>
+        </p:nvSpPr>
+        <p:spPr>
+          <a:xfrm>
+            <a:off x="976145" y="1885949"/>
+            <a:ext cx="1462255" cy="2438735"/>
+          </a:xfrm>
+          <a:prstGeom prst="rect">
+            <a:avLst/>
+          </a:prstGeom>
+          <a:noFill/>
+          <a:ln w="12700" cap="rnd">
+            <a:solidFill>
+              <a:schemeClr val="accent2">
+                <a:lumMod val="75000"/>
+              </a:schemeClr>
+            </a:solidFill>
+            <a:prstDash val="lgDash"/>
+          </a:ln>
+        </p:spPr>
+        <p:style>
+          <a:lnRef idx="2">
+            <a:schemeClr val="accent1">
+              <a:shade val="50000"/>
+            </a:schemeClr>
+          </a:lnRef>
+          <a:fillRef idx="1">
+            <a:schemeClr val="accent1"/>
+          </a:fillRef>
+          <a:effectRef idx="0">
+            <a:schemeClr val="accent1"/>
+          </a:effectRef>
+          <a:fontRef idx="minor">
+            <a:schemeClr val="lt1"/>
+          </a:fontRef>
+        </p:style>
+        <p:txBody>
+          <a:bodyPr rtlCol="0" anchor="ctr"/>
+          <a:lstStyle/>
+          <a:p>
+            <a:pPr algn="ctr"/>
+            <a:endParaRPr lang="en-GB"/>
+          </a:p>
+        </p:txBody>
+      </p:sp>
+      <p:sp>
+        <p:nvSpPr>
+          <p:cNvPr id="96" name="Rectangle 95"/>
+          <p:cNvSpPr/>
+          <p:nvPr/>
+        </p:nvSpPr>
+        <p:spPr>
+          <a:xfrm>
+            <a:off x="2482745" y="1885949"/>
+            <a:ext cx="1462255" cy="2438735"/>
+          </a:xfrm>
+          <a:prstGeom prst="rect">
+            <a:avLst/>
+          </a:prstGeom>
+          <a:noFill/>
+          <a:ln w="12700" cap="rnd">
+            <a:solidFill>
+              <a:schemeClr val="accent2">
+                <a:lumMod val="75000"/>
+              </a:schemeClr>
+            </a:solidFill>
+            <a:prstDash val="lgDash"/>
+          </a:ln>
+        </p:spPr>
+        <p:style>
+          <a:lnRef idx="2">
+            <a:schemeClr val="accent1">
+              <a:shade val="50000"/>
+            </a:schemeClr>
+          </a:lnRef>
+          <a:fillRef idx="1">
+            <a:schemeClr val="accent1"/>
+          </a:fillRef>
+          <a:effectRef idx="0">
+            <a:schemeClr val="accent1"/>
+          </a:effectRef>
+          <a:fontRef idx="minor">
+            <a:schemeClr val="lt1"/>
+          </a:fontRef>
+        </p:style>
+        <p:txBody>
+          <a:bodyPr rtlCol="0" anchor="ctr"/>
+          <a:lstStyle/>
+          <a:p>
+            <a:pPr algn="ctr"/>
+            <a:endParaRPr lang="en-GB"/>
+          </a:p>
+        </p:txBody>
+      </p:sp>
+      <p:sp>
+        <p:nvSpPr>
+          <p:cNvPr id="100" name="TextBox 99"/>
+          <p:cNvSpPr txBox="1"/>
+          <p:nvPr/>
+        </p:nvSpPr>
+        <p:spPr>
+          <a:xfrm>
+            <a:off x="1365788" y="4608076"/>
+            <a:ext cx="764954" cy="246221"/>
+          </a:xfrm>
+          <a:prstGeom prst="rect">
+            <a:avLst/>
+          </a:prstGeom>
+          <a:noFill/>
+        </p:spPr>
+        <p:txBody>
+          <a:bodyPr wrap="none" rtlCol="0">
+            <a:spAutoFit/>
+          </a:bodyPr>
+          <a:lstStyle/>
+          <a:p>
+            <a:pPr algn="ctr"/>
+            <a:r>
+              <a:rPr lang="en-US" sz="1000" dirty="0" smtClean="0">
+                <a:latin typeface="Verdana" pitchFamily="34" charset="0"/>
+                <a:ea typeface="Verdana" pitchFamily="34" charset="0"/>
+                <a:cs typeface="Verdana" pitchFamily="34" charset="0"/>
+              </a:rPr>
+              <a:t>Auto Tap</a:t>
+            </a:r>
+            <a:endParaRPr lang="en-GB" sz="1000" dirty="0">
+              <a:latin typeface="Verdana" pitchFamily="34" charset="0"/>
+              <a:ea typeface="Verdana" pitchFamily="34" charset="0"/>
+              <a:cs typeface="Verdana" pitchFamily="34" charset="0"/>
+            </a:endParaRPr>
+          </a:p>
+        </p:txBody>
+      </p:sp>
+      <p:sp>
+        <p:nvSpPr>
+          <p:cNvPr id="101" name="TextBox 100"/>
+          <p:cNvSpPr txBox="1"/>
+          <p:nvPr/>
+        </p:nvSpPr>
+        <p:spPr>
+          <a:xfrm>
+            <a:off x="2753196" y="4608076"/>
+            <a:ext cx="949299" cy="246221"/>
+          </a:xfrm>
+          <a:prstGeom prst="rect">
+            <a:avLst/>
+          </a:prstGeom>
+          <a:noFill/>
+        </p:spPr>
+        <p:txBody>
+          <a:bodyPr wrap="none" rtlCol="0">
+            <a:spAutoFit/>
+          </a:bodyPr>
+          <a:lstStyle/>
+          <a:p>
+            <a:pPr algn="ctr"/>
+            <a:r>
+              <a:rPr lang="en-US" sz="1000" dirty="0" smtClean="0">
+                <a:latin typeface="Verdana" pitchFamily="34" charset="0"/>
+                <a:ea typeface="Verdana" pitchFamily="34" charset="0"/>
+                <a:cs typeface="Verdana" pitchFamily="34" charset="0"/>
+              </a:rPr>
+              <a:t>Cross Tap 1</a:t>
+            </a:r>
+            <a:endParaRPr lang="en-GB" sz="1000" dirty="0">
+              <a:latin typeface="Verdana" pitchFamily="34" charset="0"/>
+              <a:ea typeface="Verdana" pitchFamily="34" charset="0"/>
+              <a:cs typeface="Verdana" pitchFamily="34" charset="0"/>
+            </a:endParaRPr>
+          </a:p>
+        </p:txBody>
+      </p:sp>
+      <p:sp>
+        <p:nvSpPr>
+          <p:cNvPr id="102" name="TextBox 101"/>
+          <p:cNvSpPr txBox="1"/>
+          <p:nvPr/>
+        </p:nvSpPr>
+        <p:spPr>
+          <a:xfrm>
+            <a:off x="4244143" y="4608076"/>
+            <a:ext cx="949299" cy="246221"/>
+          </a:xfrm>
+          <a:prstGeom prst="rect">
+            <a:avLst/>
+          </a:prstGeom>
+          <a:noFill/>
+        </p:spPr>
+        <p:txBody>
+          <a:bodyPr wrap="none" rtlCol="0">
+            <a:spAutoFit/>
+          </a:bodyPr>
+          <a:lstStyle/>
+          <a:p>
+            <a:pPr algn="ctr"/>
+            <a:r>
+              <a:rPr lang="en-US" sz="1000" dirty="0" smtClean="0">
+                <a:latin typeface="Verdana" pitchFamily="34" charset="0"/>
+                <a:ea typeface="Verdana" pitchFamily="34" charset="0"/>
+                <a:cs typeface="Verdana" pitchFamily="34" charset="0"/>
+              </a:rPr>
+              <a:t>Cross Tap 2</a:t>
+            </a:r>
+            <a:endParaRPr lang="en-GB" sz="1000" dirty="0">
+              <a:latin typeface="Verdana" pitchFamily="34" charset="0"/>
+              <a:ea typeface="Verdana" pitchFamily="34" charset="0"/>
+              <a:cs typeface="Verdana" pitchFamily="34" charset="0"/>
+            </a:endParaRPr>
+          </a:p>
+        </p:txBody>
+      </p:sp>
+      <p:sp>
+        <p:nvSpPr>
+          <p:cNvPr id="103" name="TextBox 102"/>
+          <p:cNvSpPr txBox="1"/>
+          <p:nvPr/>
+        </p:nvSpPr>
+        <p:spPr>
+          <a:xfrm>
+            <a:off x="6501257" y="4587616"/>
+            <a:ext cx="1114408" cy="246221"/>
+          </a:xfrm>
+          <a:prstGeom prst="rect">
+            <a:avLst/>
+          </a:prstGeom>
+          <a:noFill/>
+        </p:spPr>
+        <p:txBody>
+          <a:bodyPr wrap="none" rtlCol="0">
+            <a:spAutoFit/>
+          </a:bodyPr>
+          <a:lstStyle/>
+          <a:p>
+            <a:pPr algn="ctr"/>
+            <a:r>
+              <a:rPr lang="en-US" sz="1000" dirty="0" smtClean="0">
+                <a:latin typeface="Verdana" pitchFamily="34" charset="0"/>
+                <a:ea typeface="Verdana" pitchFamily="34" charset="0"/>
+                <a:cs typeface="Verdana" pitchFamily="34" charset="0"/>
+              </a:rPr>
+              <a:t>Cross Tap M/2</a:t>
+            </a:r>
+            <a:endParaRPr lang="en-GB" sz="1000" dirty="0">
+              <a:latin typeface="Verdana" pitchFamily="34" charset="0"/>
+              <a:ea typeface="Verdana" pitchFamily="34" charset="0"/>
+              <a:cs typeface="Verdana" pitchFamily="34" charset="0"/>
+            </a:endParaRPr>
+          </a:p>
+        </p:txBody>
+      </p:sp>
+      <p:sp>
+        <p:nvSpPr>
+          <p:cNvPr id="104" name="TextBox 103"/>
+          <p:cNvSpPr txBox="1"/>
+          <p:nvPr/>
+        </p:nvSpPr>
+        <p:spPr>
+          <a:xfrm>
+            <a:off x="691886" y="1156613"/>
+            <a:ext cx="2877711" cy="430887"/>
+          </a:xfrm>
+          <a:prstGeom prst="rect">
+            <a:avLst/>
+          </a:prstGeom>
+          <a:noFill/>
+        </p:spPr>
+        <p:txBody>
+          <a:bodyPr wrap="none" rtlCol="0">
+            <a:spAutoFit/>
+          </a:bodyPr>
+          <a:lstStyle/>
+          <a:p>
+            <a:r>
+              <a:rPr lang="en-US" sz="1200" dirty="0" smtClean="0">
+                <a:latin typeface="Verdana" pitchFamily="34" charset="0"/>
+                <a:ea typeface="Verdana" pitchFamily="34" charset="0"/>
+                <a:cs typeface="Verdana" pitchFamily="34" charset="0"/>
+              </a:rPr>
+              <a:t>Pipelined X-Engine</a:t>
+            </a:r>
+          </a:p>
+          <a:p>
+            <a:r>
+              <a:rPr lang="en-US" sz="1000" dirty="0" smtClean="0">
+                <a:latin typeface="Verdana" pitchFamily="34" charset="0"/>
+                <a:ea typeface="Verdana" pitchFamily="34" charset="0"/>
+                <a:cs typeface="Verdana" pitchFamily="34" charset="0"/>
+              </a:rPr>
+              <a:t>  N time sample per antenna, M antennas</a:t>
+            </a:r>
+            <a:endParaRPr lang="en-GB" sz="1000" dirty="0">
+              <a:latin typeface="Verdana" pitchFamily="34" charset="0"/>
+              <a:ea typeface="Verdana" pitchFamily="34" charset="0"/>
+              <a:cs typeface="Verdana" pitchFamily="34" charset="0"/>
+            </a:endParaRPr>
+          </a:p>
+        </p:txBody>
+      </p:sp>
+      <p:sp>
+        <p:nvSpPr>
+          <p:cNvPr id="105" name="TextBox 104"/>
+          <p:cNvSpPr txBox="1"/>
+          <p:nvPr/>
+        </p:nvSpPr>
+        <p:spPr>
+          <a:xfrm>
+            <a:off x="1842230" y="3796951"/>
+            <a:ext cx="250390" cy="215444"/>
+          </a:xfrm>
+          <a:prstGeom prst="rect">
+            <a:avLst/>
+          </a:prstGeom>
+          <a:noFill/>
+        </p:spPr>
+        <p:txBody>
+          <a:bodyPr wrap="none" rtlCol="0">
+            <a:spAutoFit/>
+          </a:bodyPr>
+          <a:lstStyle/>
+          <a:p>
+            <a:r>
+              <a:rPr lang="en-US" sz="800" dirty="0" smtClean="0"/>
+              <a:t>N</a:t>
+            </a:r>
+            <a:endParaRPr lang="en-GB" sz="800" dirty="0"/>
+          </a:p>
+        </p:txBody>
+      </p:sp>
+      <p:sp>
+        <p:nvSpPr>
+          <p:cNvPr id="106" name="TextBox 105"/>
+          <p:cNvSpPr txBox="1"/>
+          <p:nvPr/>
+        </p:nvSpPr>
+        <p:spPr>
+          <a:xfrm>
+            <a:off x="3553436" y="3830211"/>
+            <a:ext cx="301686" cy="400110"/>
+          </a:xfrm>
+          <a:prstGeom prst="rect">
+            <a:avLst/>
+          </a:prstGeom>
+          <a:noFill/>
+        </p:spPr>
+        <p:txBody>
+          <a:bodyPr wrap="none" rtlCol="0">
+            <a:spAutoFit/>
+          </a:bodyPr>
+          <a:lstStyle/>
+          <a:p>
+            <a:r>
+              <a:rPr lang="el-GR" sz="2000" dirty="0" smtClean="0"/>
+              <a:t>Σ</a:t>
+            </a:r>
+            <a:endParaRPr lang="en-GB" sz="2000" dirty="0"/>
+          </a:p>
+        </p:txBody>
+      </p:sp>
+      <p:sp>
+        <p:nvSpPr>
+          <p:cNvPr id="107" name="TextBox 106"/>
+          <p:cNvSpPr txBox="1"/>
+          <p:nvPr/>
+        </p:nvSpPr>
+        <p:spPr>
+          <a:xfrm>
+            <a:off x="3575942" y="3797131"/>
+            <a:ext cx="250390" cy="215444"/>
+          </a:xfrm>
+          <a:prstGeom prst="rect">
+            <a:avLst/>
+          </a:prstGeom>
+          <a:noFill/>
+        </p:spPr>
+        <p:txBody>
+          <a:bodyPr wrap="none" rtlCol="0">
+            <a:spAutoFit/>
+          </a:bodyPr>
+          <a:lstStyle/>
+          <a:p>
+            <a:r>
+              <a:rPr lang="en-US" sz="800" dirty="0" smtClean="0"/>
+              <a:t>N</a:t>
+            </a:r>
+            <a:endParaRPr lang="en-GB" sz="800" dirty="0"/>
+          </a:p>
+        </p:txBody>
+      </p:sp>
+      <p:sp>
+        <p:nvSpPr>
+          <p:cNvPr id="87" name="Rectangle 86"/>
+          <p:cNvSpPr/>
+          <p:nvPr/>
+        </p:nvSpPr>
+        <p:spPr>
+          <a:xfrm>
+            <a:off x="1327450" y="2018035"/>
+            <a:ext cx="648072" cy="216024"/>
+          </a:xfrm>
+          <a:prstGeom prst="rect">
+            <a:avLst/>
+          </a:prstGeom>
+          <a:solidFill>
+            <a:schemeClr val="bg1"/>
+          </a:solidFill>
+          <a:ln w="9525">
+            <a:solidFill>
+              <a:schemeClr val="tx1"/>
+            </a:solidFill>
+          </a:ln>
+        </p:spPr>
+        <p:style>
+          <a:lnRef idx="2">
+            <a:schemeClr val="accent1">
+              <a:shade val="50000"/>
+            </a:schemeClr>
+          </a:lnRef>
+          <a:fillRef idx="1">
+            <a:schemeClr val="accent1"/>
+          </a:fillRef>
+          <a:effectRef idx="0">
+            <a:schemeClr val="accent1"/>
+          </a:effectRef>
+          <a:fontRef idx="minor">
+            <a:schemeClr val="lt1"/>
+          </a:fontRef>
+        </p:style>
+        <p:txBody>
+          <a:bodyPr rtlCol="0" anchor="ctr"/>
+          <a:lstStyle/>
+          <a:p>
+            <a:pPr algn="ctr"/>
+            <a:endParaRPr lang="en-GB"/>
+          </a:p>
+        </p:txBody>
+      </p:sp>
+      <p:sp>
+        <p:nvSpPr>
+          <p:cNvPr id="88" name="TextBox 87"/>
+          <p:cNvSpPr txBox="1"/>
+          <p:nvPr/>
+        </p:nvSpPr>
+        <p:spPr>
+          <a:xfrm>
+            <a:off x="1327223" y="1977818"/>
+            <a:ext cx="648299" cy="307777"/>
+          </a:xfrm>
+          <a:prstGeom prst="rect">
+            <a:avLst/>
+          </a:prstGeom>
+          <a:noFill/>
+        </p:spPr>
+        <p:txBody>
+          <a:bodyPr wrap="square" rtlCol="0">
+            <a:spAutoFit/>
+          </a:bodyPr>
+          <a:lstStyle/>
+          <a:p>
+            <a:r>
+              <a:rPr lang="en-US" sz="1400" dirty="0" smtClean="0"/>
+              <a:t>z</a:t>
+            </a:r>
+            <a:r>
+              <a:rPr lang="en-US" sz="1400" baseline="30000" dirty="0" smtClean="0"/>
+              <a:t>-(M/2)N</a:t>
+            </a:r>
+            <a:endParaRPr lang="en-GB" sz="1400" baseline="30000" dirty="0"/>
+          </a:p>
+        </p:txBody>
+      </p:sp>
+      <p:cxnSp>
+        <p:nvCxnSpPr>
+          <p:cNvPr id="89" name="Straight Connector 88"/>
+          <p:cNvCxnSpPr/>
+          <p:nvPr/>
+        </p:nvCxnSpPr>
+        <p:spPr>
+          <a:xfrm>
+            <a:off x="1098135" y="2459302"/>
+            <a:ext cx="0" cy="1055797"/>
+          </a:xfrm>
+          <a:prstGeom prst="line">
+            <a:avLst/>
+          </a:prstGeom>
+          <a:ln>
+            <a:solidFill>
+              <a:schemeClr val="tx1"/>
+            </a:solidFill>
+            <a:tailEnd type="none"/>
+          </a:ln>
+        </p:spPr>
+        <p:style>
+          <a:lnRef idx="1">
+            <a:schemeClr val="accent1"/>
+          </a:lnRef>
+          <a:fillRef idx="0">
+            <a:schemeClr val="accent1"/>
+          </a:fillRef>
+          <a:effectRef idx="0">
+            <a:schemeClr val="accent1"/>
+          </a:effectRef>
+          <a:fontRef idx="minor">
+            <a:schemeClr val="tx1"/>
+          </a:fontRef>
+        </p:style>
+      </p:cxnSp>
+      <p:cxnSp>
+        <p:nvCxnSpPr>
+          <p:cNvPr id="113" name="Straight Connector 112"/>
+          <p:cNvCxnSpPr>
+            <a:endCxn id="87" idx="1"/>
+          </p:cNvCxnSpPr>
+          <p:nvPr/>
+        </p:nvCxnSpPr>
+        <p:spPr>
+          <a:xfrm>
+            <a:off x="616332" y="2126040"/>
+            <a:ext cx="711118" cy="7"/>
+          </a:xfrm>
+          <a:prstGeom prst="line">
+            <a:avLst/>
+          </a:prstGeom>
+          <a:ln>
+            <a:solidFill>
+              <a:schemeClr val="tx1"/>
+            </a:solidFill>
+            <a:tailEnd type="stealth"/>
+          </a:ln>
+        </p:spPr>
+        <p:style>
+          <a:lnRef idx="1">
+            <a:schemeClr val="accent1"/>
+          </a:lnRef>
+          <a:fillRef idx="0">
+            <a:schemeClr val="accent1"/>
+          </a:fillRef>
+          <a:effectRef idx="0">
+            <a:schemeClr val="accent1"/>
+          </a:effectRef>
+          <a:fontRef idx="minor">
+            <a:schemeClr val="tx1"/>
+          </a:fontRef>
+        </p:style>
+      </p:cxnSp>
+      <p:cxnSp>
+        <p:nvCxnSpPr>
+          <p:cNvPr id="137" name="Straight Connector 136"/>
+          <p:cNvCxnSpPr/>
+          <p:nvPr/>
+        </p:nvCxnSpPr>
+        <p:spPr>
+          <a:xfrm flipV="1">
+            <a:off x="2660313" y="3301626"/>
+            <a:ext cx="0" cy="220157"/>
+          </a:xfrm>
+          <a:prstGeom prst="line">
+            <a:avLst/>
+          </a:prstGeom>
+          <a:ln>
+            <a:solidFill>
+              <a:schemeClr val="tx1"/>
+            </a:solidFill>
+            <a:tailEnd type="oval"/>
+          </a:ln>
+        </p:spPr>
+        <p:style>
+          <a:lnRef idx="1">
+            <a:schemeClr val="accent1"/>
+          </a:lnRef>
+          <a:fillRef idx="0">
+            <a:schemeClr val="accent1"/>
+          </a:fillRef>
+          <a:effectRef idx="0">
+            <a:schemeClr val="accent1"/>
+          </a:effectRef>
+          <a:fontRef idx="minor">
+            <a:schemeClr val="tx1"/>
+          </a:fontRef>
+        </p:style>
+      </p:cxnSp>
+      <p:cxnSp>
+        <p:nvCxnSpPr>
+          <p:cNvPr id="140" name="Straight Connector 139"/>
+          <p:cNvCxnSpPr/>
+          <p:nvPr/>
+        </p:nvCxnSpPr>
+        <p:spPr>
+          <a:xfrm>
+            <a:off x="2660313" y="2126047"/>
+            <a:ext cx="0" cy="1001873"/>
+          </a:xfrm>
+          <a:prstGeom prst="line">
+            <a:avLst/>
+          </a:prstGeom>
+          <a:ln>
+            <a:solidFill>
+              <a:schemeClr val="tx1"/>
+            </a:solidFill>
+            <a:tailEnd type="oval"/>
+          </a:ln>
+        </p:spPr>
+        <p:style>
+          <a:lnRef idx="1">
+            <a:schemeClr val="accent1"/>
+          </a:lnRef>
+          <a:fillRef idx="0">
+            <a:schemeClr val="accent1"/>
+          </a:fillRef>
+          <a:effectRef idx="0">
+            <a:schemeClr val="accent1"/>
+          </a:effectRef>
+          <a:fontRef idx="minor">
+            <a:schemeClr val="tx1"/>
+          </a:fontRef>
+        </p:style>
+      </p:cxnSp>
+      <p:cxnSp>
+        <p:nvCxnSpPr>
+          <p:cNvPr id="143" name="Straight Connector 142"/>
+          <p:cNvCxnSpPr>
+            <a:endCxn id="6" idx="2"/>
+          </p:cNvCxnSpPr>
+          <p:nvPr/>
+        </p:nvCxnSpPr>
+        <p:spPr>
+          <a:xfrm>
+            <a:off x="1091449" y="3214773"/>
+            <a:ext cx="300058" cy="0"/>
+          </a:xfrm>
+          <a:prstGeom prst="line">
+            <a:avLst/>
+          </a:prstGeom>
+          <a:ln>
+            <a:solidFill>
+              <a:schemeClr val="tx1"/>
+            </a:solidFill>
+            <a:tailEnd type="stealth"/>
+          </a:ln>
+        </p:spPr>
+        <p:style>
+          <a:lnRef idx="1">
+            <a:schemeClr val="accent1"/>
+          </a:lnRef>
+          <a:fillRef idx="0">
+            <a:schemeClr val="accent1"/>
+          </a:fillRef>
+          <a:effectRef idx="0">
+            <a:schemeClr val="accent1"/>
+          </a:effectRef>
+          <a:fontRef idx="minor">
+            <a:schemeClr val="tx1"/>
+          </a:fontRef>
+        </p:style>
+      </p:cxnSp>
+      <p:cxnSp>
+        <p:nvCxnSpPr>
+          <p:cNvPr id="146" name="Straight Connector 145"/>
+          <p:cNvCxnSpPr>
+            <a:endCxn id="6" idx="0"/>
+          </p:cNvCxnSpPr>
+          <p:nvPr/>
+        </p:nvCxnSpPr>
+        <p:spPr>
+          <a:xfrm>
+            <a:off x="1514337" y="2459311"/>
+            <a:ext cx="0" cy="632632"/>
+          </a:xfrm>
+          <a:prstGeom prst="line">
+            <a:avLst/>
+          </a:prstGeom>
+          <a:ln>
+            <a:solidFill>
+              <a:schemeClr val="tx1"/>
+            </a:solidFill>
+            <a:tailEnd type="stealth"/>
+          </a:ln>
+        </p:spPr>
+        <p:style>
+          <a:lnRef idx="1">
+            <a:schemeClr val="accent1"/>
+          </a:lnRef>
+          <a:fillRef idx="0">
+            <a:schemeClr val="accent1"/>
+          </a:fillRef>
+          <a:effectRef idx="0">
+            <a:schemeClr val="accent1"/>
+          </a:effectRef>
+          <a:fontRef idx="minor">
+            <a:schemeClr val="tx1"/>
+          </a:fontRef>
+        </p:style>
+      </p:cxnSp>
+      <p:cxnSp>
+        <p:nvCxnSpPr>
+          <p:cNvPr id="165" name="Straight Connector 164"/>
+          <p:cNvCxnSpPr/>
+          <p:nvPr/>
+        </p:nvCxnSpPr>
+        <p:spPr>
+          <a:xfrm>
+            <a:off x="616332" y="1744579"/>
+            <a:ext cx="2108" cy="381461"/>
+          </a:xfrm>
+          <a:prstGeom prst="line">
+            <a:avLst/>
+          </a:prstGeom>
+          <a:ln>
+            <a:solidFill>
+              <a:schemeClr val="tx1"/>
+            </a:solidFill>
+            <a:tailEnd type="none"/>
+          </a:ln>
+        </p:spPr>
+        <p:style>
+          <a:lnRef idx="1">
+            <a:schemeClr val="accent1"/>
+          </a:lnRef>
+          <a:fillRef idx="0">
+            <a:schemeClr val="accent1"/>
+          </a:fillRef>
+          <a:effectRef idx="0">
+            <a:schemeClr val="accent1"/>
+          </a:effectRef>
+          <a:fontRef idx="minor">
+            <a:schemeClr val="tx1"/>
+          </a:fontRef>
+        </p:style>
+      </p:cxnSp>
+      <p:cxnSp>
+        <p:nvCxnSpPr>
+          <p:cNvPr id="215" name="Straight Connector 214"/>
+          <p:cNvCxnSpPr/>
+          <p:nvPr/>
+        </p:nvCxnSpPr>
+        <p:spPr>
+          <a:xfrm>
+            <a:off x="147053" y="3515099"/>
+            <a:ext cx="5307248" cy="8730"/>
+          </a:xfrm>
+          <a:prstGeom prst="line">
+            <a:avLst/>
+          </a:prstGeom>
+          <a:ln>
+            <a:solidFill>
+              <a:schemeClr val="tx1"/>
+            </a:solidFill>
+            <a:tailEnd type="stealth"/>
+          </a:ln>
+        </p:spPr>
+        <p:style>
+          <a:lnRef idx="1">
+            <a:schemeClr val="accent1"/>
+          </a:lnRef>
+          <a:fillRef idx="0">
+            <a:schemeClr val="accent1"/>
+          </a:fillRef>
+          <a:effectRef idx="0">
+            <a:schemeClr val="accent1"/>
+          </a:effectRef>
+          <a:fontRef idx="minor">
+            <a:schemeClr val="tx1"/>
+          </a:fontRef>
+        </p:style>
+      </p:cxnSp>
+      <p:cxnSp>
+        <p:nvCxnSpPr>
+          <p:cNvPr id="218" name="Straight Connector 217"/>
+          <p:cNvCxnSpPr>
+            <a:stCxn id="88" idx="3"/>
+          </p:cNvCxnSpPr>
+          <p:nvPr/>
+        </p:nvCxnSpPr>
+        <p:spPr>
+          <a:xfrm flipV="1">
+            <a:off x="1975522" y="2126040"/>
+            <a:ext cx="3478779" cy="5667"/>
+          </a:xfrm>
+          <a:prstGeom prst="line">
+            <a:avLst/>
+          </a:prstGeom>
+          <a:ln>
+            <a:solidFill>
+              <a:schemeClr val="tx1"/>
+            </a:solidFill>
+            <a:tailEnd type="stealth"/>
+          </a:ln>
+        </p:spPr>
+        <p:style>
+          <a:lnRef idx="1">
+            <a:schemeClr val="accent1"/>
+          </a:lnRef>
+          <a:fillRef idx="0">
+            <a:schemeClr val="accent1"/>
+          </a:fillRef>
+          <a:effectRef idx="0">
+            <a:schemeClr val="accent1"/>
+          </a:effectRef>
+          <a:fontRef idx="minor">
+            <a:schemeClr val="tx1"/>
+          </a:fontRef>
+        </p:style>
+      </p:cxnSp>
+      <p:cxnSp>
+        <p:nvCxnSpPr>
+          <p:cNvPr id="221" name="Straight Connector 220"/>
+          <p:cNvCxnSpPr/>
+          <p:nvPr/>
+        </p:nvCxnSpPr>
+        <p:spPr>
+          <a:xfrm>
+            <a:off x="5490257" y="2124223"/>
+            <a:ext cx="726669" cy="0"/>
+          </a:xfrm>
+          <a:prstGeom prst="line">
+            <a:avLst/>
+          </a:prstGeom>
+          <a:ln>
+            <a:solidFill>
+              <a:schemeClr val="tx1"/>
+            </a:solidFill>
+            <a:prstDash val="lgDash"/>
+          </a:ln>
+        </p:spPr>
+        <p:style>
+          <a:lnRef idx="1">
+            <a:schemeClr val="accent1"/>
+          </a:lnRef>
+          <a:fillRef idx="0">
+            <a:schemeClr val="accent1"/>
+          </a:fillRef>
+          <a:effectRef idx="0">
+            <a:schemeClr val="accent1"/>
+          </a:effectRef>
+          <a:fontRef idx="minor">
+            <a:schemeClr val="tx1"/>
+          </a:fontRef>
+        </p:style>
+      </p:cxnSp>
+      <p:cxnSp>
+        <p:nvCxnSpPr>
+          <p:cNvPr id="236" name="Straight Connector 235"/>
+          <p:cNvCxnSpPr/>
+          <p:nvPr/>
+        </p:nvCxnSpPr>
+        <p:spPr>
+          <a:xfrm flipH="1">
+            <a:off x="2660313" y="3214766"/>
+            <a:ext cx="140371" cy="86862"/>
+          </a:xfrm>
+          <a:prstGeom prst="line">
+            <a:avLst/>
+          </a:prstGeom>
+          <a:ln>
+            <a:solidFill>
+              <a:schemeClr val="tx1"/>
+            </a:solidFill>
+            <a:tailEnd type="none"/>
+          </a:ln>
+        </p:spPr>
+        <p:style>
+          <a:lnRef idx="1">
+            <a:schemeClr val="accent1"/>
+          </a:lnRef>
+          <a:fillRef idx="0">
+            <a:schemeClr val="accent1"/>
+          </a:fillRef>
+          <a:effectRef idx="0">
+            <a:schemeClr val="accent1"/>
+          </a:effectRef>
+          <a:fontRef idx="minor">
+            <a:schemeClr val="tx1"/>
+          </a:fontRef>
+        </p:style>
+      </p:cxnSp>
+      <p:sp>
+        <p:nvSpPr>
+          <p:cNvPr id="266" name="Circular Arrow 265"/>
+          <p:cNvSpPr/>
+          <p:nvPr/>
+        </p:nvSpPr>
+        <p:spPr>
+          <a:xfrm rot="16200000">
+            <a:off x="2466443" y="3123534"/>
+            <a:ext cx="254060" cy="190860"/>
+          </a:xfrm>
+          <a:prstGeom prst="circularArrow">
+            <a:avLst>
+              <a:gd name="adj1" fmla="val 0"/>
+              <a:gd name="adj2" fmla="val 893028"/>
+              <a:gd name="adj3" fmla="val 20614661"/>
+              <a:gd name="adj4" fmla="val 10800000"/>
+              <a:gd name="adj5" fmla="val 8324"/>
+            </a:avLst>
+          </a:prstGeom>
+          <a:solidFill>
+            <a:schemeClr val="tx1"/>
+          </a:solidFill>
+          <a:ln w="9525" cmpd="sng">
+            <a:solidFill>
+              <a:schemeClr val="tx1"/>
+            </a:solidFill>
+          </a:ln>
+          <a:effectLst/>
+        </p:spPr>
+        <p:style>
+          <a:lnRef idx="1">
+            <a:schemeClr val="accent1"/>
+          </a:lnRef>
+          <a:fillRef idx="3">
+            <a:schemeClr val="accent1"/>
+          </a:fillRef>
+          <a:effectRef idx="2">
+            <a:schemeClr val="accent1"/>
+          </a:effectRef>
+          <a:fontRef idx="minor">
+            <a:schemeClr val="lt1"/>
+          </a:fontRef>
+        </p:style>
+        <p:txBody>
+          <a:bodyPr rtlCol="0" anchor="ctr"/>
+          <a:lstStyle/>
+          <a:p>
+            <a:pPr algn="ctr"/>
+            <a:endParaRPr lang="en-US">
+              <a:solidFill>
+                <a:schemeClr val="tx1"/>
+              </a:solidFill>
+            </a:endParaRPr>
+          </a:p>
+        </p:txBody>
+      </p:sp>
+      <p:cxnSp>
+        <p:nvCxnSpPr>
+          <p:cNvPr id="293" name="Elbow Connector 10"/>
+          <p:cNvCxnSpPr/>
+          <p:nvPr/>
+        </p:nvCxnSpPr>
+        <p:spPr>
+          <a:xfrm>
+            <a:off x="1098135" y="2465986"/>
+            <a:ext cx="416202" cy="13"/>
+          </a:xfrm>
+          <a:prstGeom prst="bentConnector3">
+            <a:avLst>
+              <a:gd name="adj1" fmla="val 50000"/>
+            </a:avLst>
+          </a:prstGeom>
+          <a:ln>
+            <a:solidFill>
+              <a:schemeClr val="tx1"/>
+            </a:solidFill>
+            <a:tailEnd type="none"/>
+          </a:ln>
+        </p:spPr>
+        <p:style>
+          <a:lnRef idx="1">
+            <a:schemeClr val="accent1"/>
+          </a:lnRef>
+          <a:fillRef idx="0">
+            <a:schemeClr val="accent1"/>
+          </a:fillRef>
+          <a:effectRef idx="0">
+            <a:schemeClr val="accent1"/>
+          </a:effectRef>
+          <a:fontRef idx="minor">
+            <a:schemeClr val="tx1"/>
+          </a:fontRef>
+        </p:style>
+      </p:cxnSp>
+      <p:cxnSp>
+        <p:nvCxnSpPr>
+          <p:cNvPr id="322" name="Straight Connector 321"/>
+          <p:cNvCxnSpPr>
+            <a:endCxn id="14" idx="0"/>
+          </p:cNvCxnSpPr>
+          <p:nvPr/>
+        </p:nvCxnSpPr>
+        <p:spPr>
+          <a:xfrm flipH="1">
+            <a:off x="3461937" y="2468033"/>
+            <a:ext cx="5314" cy="623910"/>
+          </a:xfrm>
+          <a:prstGeom prst="line">
+            <a:avLst/>
+          </a:prstGeom>
+          <a:ln>
+            <a:solidFill>
+              <a:schemeClr val="tx1"/>
+            </a:solidFill>
+            <a:tailEnd type="stealth"/>
+          </a:ln>
+        </p:spPr>
+        <p:style>
+          <a:lnRef idx="1">
+            <a:schemeClr val="accent1"/>
+          </a:lnRef>
+          <a:fillRef idx="0">
+            <a:schemeClr val="accent1"/>
+          </a:fillRef>
+          <a:effectRef idx="0">
+            <a:schemeClr val="accent1"/>
+          </a:effectRef>
+          <a:fontRef idx="minor">
+            <a:schemeClr val="tx1"/>
+          </a:fontRef>
+        </p:style>
+      </p:cxnSp>
+      <p:sp>
+        <p:nvSpPr>
+          <p:cNvPr id="325" name="Oval 324"/>
+          <p:cNvSpPr/>
+          <p:nvPr/>
+        </p:nvSpPr>
+        <p:spPr>
+          <a:xfrm>
+            <a:off x="4845862" y="3093995"/>
+            <a:ext cx="245660" cy="245660"/>
+          </a:xfrm>
+          <a:prstGeom prst="ellipse">
+            <a:avLst/>
+          </a:prstGeom>
+          <a:solidFill>
+            <a:schemeClr val="bg1"/>
+          </a:solidFill>
+          <a:ln w="9525">
+            <a:solidFill>
+              <a:schemeClr val="tx1"/>
+            </a:solidFill>
+          </a:ln>
+        </p:spPr>
+        <p:style>
+          <a:lnRef idx="2">
+            <a:schemeClr val="accent1">
+              <a:shade val="50000"/>
+            </a:schemeClr>
+          </a:lnRef>
+          <a:fillRef idx="1">
+            <a:schemeClr val="accent1"/>
+          </a:fillRef>
+          <a:effectRef idx="0">
+            <a:schemeClr val="accent1"/>
+          </a:effectRef>
+          <a:fontRef idx="minor">
+            <a:schemeClr val="lt1"/>
+          </a:fontRef>
+        </p:style>
+        <p:txBody>
+          <a:bodyPr rtlCol="0" anchor="ctr"/>
+          <a:lstStyle/>
+          <a:p>
+            <a:pPr algn="ctr"/>
+            <a:endParaRPr lang="en-GB"/>
+          </a:p>
+        </p:txBody>
+      </p:sp>
+      <p:cxnSp>
+        <p:nvCxnSpPr>
+          <p:cNvPr id="326" name="Straight Connector 325"/>
+          <p:cNvCxnSpPr>
+            <a:stCxn id="325" idx="1"/>
+            <a:endCxn id="325" idx="5"/>
+          </p:cNvCxnSpPr>
+          <p:nvPr/>
+        </p:nvCxnSpPr>
+        <p:spPr>
+          <a:xfrm rot="16200000" flipH="1">
+            <a:off x="4881838" y="3129971"/>
+            <a:ext cx="173708" cy="173708"/>
+          </a:xfrm>
+          <a:prstGeom prst="line">
+            <a:avLst/>
+          </a:prstGeom>
+          <a:ln w="12700">
+            <a:solidFill>
+              <a:schemeClr val="tx1"/>
+            </a:solidFill>
+          </a:ln>
+        </p:spPr>
+        <p:style>
+          <a:lnRef idx="1">
+            <a:schemeClr val="accent1"/>
+          </a:lnRef>
+          <a:fillRef idx="0">
+            <a:schemeClr val="accent1"/>
+          </a:fillRef>
+          <a:effectRef idx="0">
+            <a:schemeClr val="accent1"/>
+          </a:effectRef>
+          <a:fontRef idx="minor">
+            <a:schemeClr val="tx1"/>
+          </a:fontRef>
+        </p:style>
+      </p:cxnSp>
+      <p:cxnSp>
+        <p:nvCxnSpPr>
+          <p:cNvPr id="327" name="Straight Connector 326"/>
+          <p:cNvCxnSpPr>
+            <a:stCxn id="325" idx="7"/>
+            <a:endCxn id="325" idx="3"/>
+          </p:cNvCxnSpPr>
+          <p:nvPr/>
+        </p:nvCxnSpPr>
+        <p:spPr>
+          <a:xfrm rot="16200000" flipH="1" flipV="1">
+            <a:off x="4881838" y="3129971"/>
+            <a:ext cx="173708" cy="173708"/>
+          </a:xfrm>
+          <a:prstGeom prst="line">
+            <a:avLst/>
+          </a:prstGeom>
+          <a:ln w="12700">
+            <a:solidFill>
+              <a:schemeClr val="tx1"/>
+            </a:solidFill>
+          </a:ln>
+        </p:spPr>
+        <p:style>
+          <a:lnRef idx="1">
+            <a:schemeClr val="accent1"/>
+          </a:lnRef>
+          <a:fillRef idx="0">
+            <a:schemeClr val="accent1"/>
+          </a:fillRef>
+          <a:effectRef idx="0">
+            <a:schemeClr val="accent1"/>
+          </a:effectRef>
+          <a:fontRef idx="minor">
+            <a:schemeClr val="tx1"/>
+          </a:fontRef>
+        </p:style>
+      </p:cxnSp>
+      <p:sp>
+        <p:nvSpPr>
+          <p:cNvPr id="328" name="Rectangle 327"/>
+          <p:cNvSpPr/>
+          <p:nvPr/>
+        </p:nvSpPr>
+        <p:spPr>
+          <a:xfrm>
+            <a:off x="4287886" y="2362073"/>
+            <a:ext cx="533720" cy="216024"/>
+          </a:xfrm>
+          <a:prstGeom prst="rect">
+            <a:avLst/>
+          </a:prstGeom>
+          <a:solidFill>
+            <a:schemeClr val="bg1"/>
+          </a:solidFill>
+          <a:ln w="9525">
+            <a:solidFill>
+              <a:schemeClr val="tx1"/>
+            </a:solidFill>
+          </a:ln>
+        </p:spPr>
+        <p:style>
+          <a:lnRef idx="2">
+            <a:schemeClr val="accent1">
+              <a:shade val="50000"/>
+            </a:schemeClr>
+          </a:lnRef>
+          <a:fillRef idx="1">
+            <a:schemeClr val="accent1"/>
+          </a:fillRef>
+          <a:effectRef idx="0">
+            <a:schemeClr val="accent1"/>
+          </a:effectRef>
+          <a:fontRef idx="minor">
+            <a:schemeClr val="lt1"/>
+          </a:fontRef>
+        </p:style>
+        <p:txBody>
+          <a:bodyPr rtlCol="0" anchor="ctr"/>
+          <a:lstStyle/>
+          <a:p>
+            <a:pPr algn="ctr"/>
+            <a:endParaRPr lang="en-GB"/>
+          </a:p>
+        </p:txBody>
+      </p:sp>
+      <p:sp>
+        <p:nvSpPr>
+          <p:cNvPr id="329" name="TextBox 328"/>
+          <p:cNvSpPr txBox="1"/>
+          <p:nvPr/>
+        </p:nvSpPr>
+        <p:spPr>
+          <a:xfrm>
+            <a:off x="4384390" y="2313132"/>
+            <a:ext cx="369012" cy="307777"/>
+          </a:xfrm>
+          <a:prstGeom prst="rect">
+            <a:avLst/>
+          </a:prstGeom>
+          <a:noFill/>
+        </p:spPr>
+        <p:txBody>
+          <a:bodyPr wrap="none" rtlCol="0">
+            <a:spAutoFit/>
+          </a:bodyPr>
+          <a:lstStyle/>
+          <a:p>
+            <a:r>
+              <a:rPr lang="en-US" sz="1400" dirty="0" smtClean="0"/>
+              <a:t>z</a:t>
+            </a:r>
+            <a:r>
+              <a:rPr lang="en-US" sz="1400" baseline="30000" dirty="0" smtClean="0"/>
+              <a:t>-N</a:t>
+            </a:r>
+            <a:endParaRPr lang="en-GB" sz="1400" baseline="30000" dirty="0"/>
+          </a:p>
+        </p:txBody>
+      </p:sp>
+      <p:cxnSp>
+        <p:nvCxnSpPr>
+          <p:cNvPr id="330" name="Elbow Connector 10"/>
+          <p:cNvCxnSpPr>
+            <a:stCxn id="325" idx="6"/>
+            <a:endCxn id="335" idx="0"/>
+          </p:cNvCxnSpPr>
+          <p:nvPr/>
+        </p:nvCxnSpPr>
+        <p:spPr>
+          <a:xfrm>
+            <a:off x="5091522" y="3216825"/>
+            <a:ext cx="116370" cy="582358"/>
+          </a:xfrm>
+          <a:prstGeom prst="bentConnector2">
+            <a:avLst/>
+          </a:prstGeom>
+          <a:ln>
+            <a:solidFill>
+              <a:schemeClr val="tx1"/>
+            </a:solidFill>
+            <a:tailEnd type="stealth"/>
+          </a:ln>
+        </p:spPr>
+        <p:style>
+          <a:lnRef idx="1">
+            <a:schemeClr val="accent1"/>
+          </a:lnRef>
+          <a:fillRef idx="0">
+            <a:schemeClr val="accent1"/>
+          </a:fillRef>
+          <a:effectRef idx="0">
+            <a:schemeClr val="accent1"/>
+          </a:effectRef>
+          <a:fontRef idx="minor">
+            <a:schemeClr val="tx1"/>
+          </a:fontRef>
+        </p:style>
+      </p:cxnSp>
+      <p:cxnSp>
+        <p:nvCxnSpPr>
+          <p:cNvPr id="332" name="Straight Connector 331"/>
+          <p:cNvCxnSpPr>
+            <a:stCxn id="328" idx="3"/>
+          </p:cNvCxnSpPr>
+          <p:nvPr/>
+        </p:nvCxnSpPr>
+        <p:spPr>
+          <a:xfrm flipV="1">
+            <a:off x="4821606" y="2465999"/>
+            <a:ext cx="632695" cy="4086"/>
+          </a:xfrm>
+          <a:prstGeom prst="line">
+            <a:avLst/>
+          </a:prstGeom>
+          <a:ln>
+            <a:solidFill>
+              <a:schemeClr val="tx1"/>
+            </a:solidFill>
+            <a:tailEnd type="stealth"/>
+          </a:ln>
+        </p:spPr>
+        <p:style>
+          <a:lnRef idx="1">
+            <a:schemeClr val="accent1"/>
+          </a:lnRef>
+          <a:fillRef idx="0">
+            <a:schemeClr val="accent1"/>
+          </a:fillRef>
+          <a:effectRef idx="0">
+            <a:schemeClr val="accent1"/>
+          </a:effectRef>
+          <a:fontRef idx="minor">
+            <a:schemeClr val="tx1"/>
+          </a:fontRef>
+        </p:style>
+      </p:cxnSp>
+      <p:sp>
+        <p:nvSpPr>
+          <p:cNvPr id="333" name="Rectangle 332"/>
+          <p:cNvSpPr/>
+          <p:nvPr/>
+        </p:nvSpPr>
+        <p:spPr>
+          <a:xfrm>
+            <a:off x="3989500" y="1888001"/>
+            <a:ext cx="1462255" cy="2438735"/>
+          </a:xfrm>
+          <a:prstGeom prst="rect">
+            <a:avLst/>
+          </a:prstGeom>
+          <a:noFill/>
+          <a:ln w="12700" cap="rnd">
+            <a:solidFill>
+              <a:schemeClr val="accent2">
+                <a:lumMod val="75000"/>
+              </a:schemeClr>
+            </a:solidFill>
+            <a:prstDash val="lgDash"/>
+          </a:ln>
+        </p:spPr>
+        <p:style>
+          <a:lnRef idx="2">
+            <a:schemeClr val="accent1">
+              <a:shade val="50000"/>
+            </a:schemeClr>
+          </a:lnRef>
+          <a:fillRef idx="1">
+            <a:schemeClr val="accent1"/>
+          </a:fillRef>
+          <a:effectRef idx="0">
+            <a:schemeClr val="accent1"/>
+          </a:effectRef>
+          <a:fontRef idx="minor">
+            <a:schemeClr val="lt1"/>
+          </a:fontRef>
+        </p:style>
+        <p:txBody>
+          <a:bodyPr rtlCol="0" anchor="ctr"/>
+          <a:lstStyle/>
+          <a:p>
+            <a:pPr algn="ctr"/>
+            <a:endParaRPr lang="en-GB"/>
+          </a:p>
+        </p:txBody>
+      </p:sp>
+      <p:sp>
+        <p:nvSpPr>
+          <p:cNvPr id="334" name="TextBox 333"/>
+          <p:cNvSpPr txBox="1"/>
+          <p:nvPr/>
+        </p:nvSpPr>
+        <p:spPr>
+          <a:xfrm>
+            <a:off x="5060191" y="3832263"/>
+            <a:ext cx="301686" cy="400110"/>
+          </a:xfrm>
+          <a:prstGeom prst="rect">
+            <a:avLst/>
+          </a:prstGeom>
+          <a:noFill/>
+        </p:spPr>
+        <p:txBody>
+          <a:bodyPr wrap="none" rtlCol="0">
+            <a:spAutoFit/>
+          </a:bodyPr>
+          <a:lstStyle/>
+          <a:p>
+            <a:r>
+              <a:rPr lang="el-GR" sz="2000" dirty="0" smtClean="0"/>
+              <a:t>Σ</a:t>
+            </a:r>
+            <a:endParaRPr lang="en-GB" sz="2000" dirty="0"/>
+          </a:p>
+        </p:txBody>
+      </p:sp>
+      <p:sp>
+        <p:nvSpPr>
+          <p:cNvPr id="335" name="TextBox 334"/>
+          <p:cNvSpPr txBox="1"/>
+          <p:nvPr/>
+        </p:nvSpPr>
+        <p:spPr>
+          <a:xfrm>
+            <a:off x="5082697" y="3799183"/>
+            <a:ext cx="250390" cy="215444"/>
+          </a:xfrm>
+          <a:prstGeom prst="rect">
+            <a:avLst/>
+          </a:prstGeom>
+          <a:noFill/>
+        </p:spPr>
+        <p:txBody>
+          <a:bodyPr wrap="none" rtlCol="0">
+            <a:spAutoFit/>
+          </a:bodyPr>
+          <a:lstStyle/>
+          <a:p>
+            <a:r>
+              <a:rPr lang="en-US" sz="800" dirty="0" smtClean="0"/>
+              <a:t>N</a:t>
+            </a:r>
+            <a:endParaRPr lang="en-GB" sz="800" dirty="0"/>
+          </a:p>
+        </p:txBody>
+      </p:sp>
+      <p:cxnSp>
+        <p:nvCxnSpPr>
+          <p:cNvPr id="336" name="Straight Connector 335"/>
+          <p:cNvCxnSpPr>
+            <a:stCxn id="325" idx="2"/>
+          </p:cNvCxnSpPr>
+          <p:nvPr/>
+        </p:nvCxnSpPr>
+        <p:spPr>
+          <a:xfrm flipH="1" flipV="1">
+            <a:off x="4320807" y="3216818"/>
+            <a:ext cx="525055" cy="7"/>
+          </a:xfrm>
+          <a:prstGeom prst="line">
+            <a:avLst/>
+          </a:prstGeom>
+          <a:ln>
+            <a:solidFill>
+              <a:schemeClr val="tx1"/>
+            </a:solidFill>
+            <a:headEnd type="stealth"/>
+            <a:tailEnd type="oval"/>
+          </a:ln>
+        </p:spPr>
+        <p:style>
+          <a:lnRef idx="1">
+            <a:schemeClr val="accent1"/>
+          </a:lnRef>
+          <a:fillRef idx="0">
+            <a:schemeClr val="accent1"/>
+          </a:fillRef>
+          <a:effectRef idx="0">
+            <a:schemeClr val="accent1"/>
+          </a:effectRef>
+          <a:fontRef idx="minor">
+            <a:schemeClr val="tx1"/>
+          </a:fontRef>
+        </p:style>
+      </p:cxnSp>
+      <p:cxnSp>
+        <p:nvCxnSpPr>
+          <p:cNvPr id="337" name="Straight Connector 336"/>
+          <p:cNvCxnSpPr/>
+          <p:nvPr/>
+        </p:nvCxnSpPr>
+        <p:spPr>
+          <a:xfrm flipV="1">
+            <a:off x="4167068" y="3303678"/>
+            <a:ext cx="0" cy="220157"/>
+          </a:xfrm>
+          <a:prstGeom prst="line">
+            <a:avLst/>
+          </a:prstGeom>
+          <a:ln>
+            <a:solidFill>
+              <a:schemeClr val="tx1"/>
+            </a:solidFill>
+            <a:tailEnd type="oval"/>
+          </a:ln>
+        </p:spPr>
+        <p:style>
+          <a:lnRef idx="1">
+            <a:schemeClr val="accent1"/>
+          </a:lnRef>
+          <a:fillRef idx="0">
+            <a:schemeClr val="accent1"/>
+          </a:fillRef>
+          <a:effectRef idx="0">
+            <a:schemeClr val="accent1"/>
+          </a:effectRef>
+          <a:fontRef idx="minor">
+            <a:schemeClr val="tx1"/>
+          </a:fontRef>
+        </p:style>
+      </p:cxnSp>
+      <p:cxnSp>
+        <p:nvCxnSpPr>
+          <p:cNvPr id="338" name="Straight Connector 337"/>
+          <p:cNvCxnSpPr/>
+          <p:nvPr/>
+        </p:nvCxnSpPr>
+        <p:spPr>
+          <a:xfrm>
+            <a:off x="4167068" y="2128099"/>
+            <a:ext cx="0" cy="1001873"/>
+          </a:xfrm>
+          <a:prstGeom prst="line">
+            <a:avLst/>
+          </a:prstGeom>
+          <a:ln>
+            <a:solidFill>
+              <a:schemeClr val="tx1"/>
+            </a:solidFill>
+            <a:tailEnd type="oval"/>
+          </a:ln>
+        </p:spPr>
+        <p:style>
+          <a:lnRef idx="1">
+            <a:schemeClr val="accent1"/>
+          </a:lnRef>
+          <a:fillRef idx="0">
+            <a:schemeClr val="accent1"/>
+          </a:fillRef>
+          <a:effectRef idx="0">
+            <a:schemeClr val="accent1"/>
+          </a:effectRef>
+          <a:fontRef idx="minor">
+            <a:schemeClr val="tx1"/>
+          </a:fontRef>
+        </p:style>
+      </p:cxnSp>
+      <p:cxnSp>
+        <p:nvCxnSpPr>
+          <p:cNvPr id="339" name="Straight Connector 338"/>
+          <p:cNvCxnSpPr/>
+          <p:nvPr/>
+        </p:nvCxnSpPr>
+        <p:spPr>
+          <a:xfrm flipH="1">
+            <a:off x="4167068" y="3216818"/>
+            <a:ext cx="140371" cy="86862"/>
+          </a:xfrm>
+          <a:prstGeom prst="line">
+            <a:avLst/>
+          </a:prstGeom>
+          <a:ln>
+            <a:solidFill>
+              <a:schemeClr val="tx1"/>
+            </a:solidFill>
+            <a:tailEnd type="none"/>
+          </a:ln>
+        </p:spPr>
+        <p:style>
+          <a:lnRef idx="1">
+            <a:schemeClr val="accent1"/>
+          </a:lnRef>
+          <a:fillRef idx="0">
+            <a:schemeClr val="accent1"/>
+          </a:fillRef>
+          <a:effectRef idx="0">
+            <a:schemeClr val="accent1"/>
+          </a:effectRef>
+          <a:fontRef idx="minor">
+            <a:schemeClr val="tx1"/>
+          </a:fontRef>
+        </p:style>
+      </p:cxnSp>
+      <p:sp>
+        <p:nvSpPr>
+          <p:cNvPr id="340" name="Circular Arrow 339"/>
+          <p:cNvSpPr/>
+          <p:nvPr/>
+        </p:nvSpPr>
+        <p:spPr>
+          <a:xfrm rot="16200000">
+            <a:off x="3973198" y="3125586"/>
+            <a:ext cx="254060" cy="190860"/>
+          </a:xfrm>
+          <a:prstGeom prst="circularArrow">
+            <a:avLst>
+              <a:gd name="adj1" fmla="val 0"/>
+              <a:gd name="adj2" fmla="val 893028"/>
+              <a:gd name="adj3" fmla="val 20614661"/>
+              <a:gd name="adj4" fmla="val 10800000"/>
+              <a:gd name="adj5" fmla="val 8324"/>
+            </a:avLst>
+          </a:prstGeom>
+          <a:solidFill>
+            <a:schemeClr val="tx1"/>
+          </a:solidFill>
+          <a:ln w="9525" cmpd="sng">
+            <a:solidFill>
+              <a:schemeClr val="tx1"/>
+            </a:solidFill>
+          </a:ln>
+          <a:effectLst/>
+        </p:spPr>
+        <p:style>
+          <a:lnRef idx="1">
+            <a:schemeClr val="accent1"/>
+          </a:lnRef>
+          <a:fillRef idx="3">
+            <a:schemeClr val="accent1"/>
+          </a:fillRef>
+          <a:effectRef idx="2">
+            <a:schemeClr val="accent1"/>
+          </a:effectRef>
+          <a:fontRef idx="minor">
+            <a:schemeClr val="lt1"/>
+          </a:fontRef>
+        </p:style>
+        <p:txBody>
+          <a:bodyPr rtlCol="0" anchor="ctr"/>
+          <a:lstStyle/>
+          <a:p>
+            <a:pPr algn="ctr"/>
+            <a:endParaRPr lang="en-US">
+              <a:solidFill>
+                <a:schemeClr val="tx1"/>
+              </a:solidFill>
+            </a:endParaRPr>
+          </a:p>
+        </p:txBody>
+      </p:sp>
+      <p:cxnSp>
+        <p:nvCxnSpPr>
+          <p:cNvPr id="341" name="Straight Connector 340"/>
+          <p:cNvCxnSpPr>
+            <a:endCxn id="325" idx="0"/>
+          </p:cNvCxnSpPr>
+          <p:nvPr/>
+        </p:nvCxnSpPr>
+        <p:spPr>
+          <a:xfrm flipH="1">
+            <a:off x="4968692" y="2470085"/>
+            <a:ext cx="5314" cy="623910"/>
+          </a:xfrm>
+          <a:prstGeom prst="line">
+            <a:avLst/>
+          </a:prstGeom>
+          <a:ln>
+            <a:solidFill>
+              <a:schemeClr val="tx1"/>
+            </a:solidFill>
+            <a:tailEnd type="stealth"/>
+          </a:ln>
+        </p:spPr>
+        <p:style>
+          <a:lnRef idx="1">
+            <a:schemeClr val="accent1"/>
+          </a:lnRef>
+          <a:fillRef idx="0">
+            <a:schemeClr val="accent1"/>
+          </a:fillRef>
+          <a:effectRef idx="0">
+            <a:schemeClr val="accent1"/>
+          </a:effectRef>
+          <a:fontRef idx="minor">
+            <a:schemeClr val="tx1"/>
+          </a:fontRef>
+        </p:style>
+      </p:cxnSp>
+      <p:sp>
+        <p:nvSpPr>
+          <p:cNvPr id="331" name="Rectangle 330"/>
+          <p:cNvSpPr/>
+          <p:nvPr/>
+        </p:nvSpPr>
+        <p:spPr>
+          <a:xfrm>
+            <a:off x="5045874" y="3814075"/>
+            <a:ext cx="324036" cy="369332"/>
+          </a:xfrm>
+          <a:prstGeom prst="rect">
+            <a:avLst/>
+          </a:prstGeom>
+          <a:noFill/>
+          <a:ln w="9525">
+            <a:solidFill>
+              <a:schemeClr val="tx1"/>
+            </a:solidFill>
+          </a:ln>
+        </p:spPr>
+        <p:style>
+          <a:lnRef idx="2">
+            <a:schemeClr val="accent1">
+              <a:shade val="50000"/>
+            </a:schemeClr>
+          </a:lnRef>
+          <a:fillRef idx="1">
+            <a:schemeClr val="accent1"/>
+          </a:fillRef>
+          <a:effectRef idx="0">
+            <a:schemeClr val="accent1"/>
+          </a:effectRef>
+          <a:fontRef idx="minor">
+            <a:schemeClr val="lt1"/>
+          </a:fontRef>
+        </p:style>
+        <p:txBody>
+          <a:bodyPr rtlCol="0" anchor="ctr"/>
+          <a:lstStyle/>
+          <a:p>
+            <a:pPr algn="ctr"/>
+            <a:endParaRPr lang="en-GB"/>
+          </a:p>
+        </p:txBody>
+      </p:sp>
+      <p:cxnSp>
+        <p:nvCxnSpPr>
+          <p:cNvPr id="351" name="Straight Connector 350"/>
+          <p:cNvCxnSpPr/>
+          <p:nvPr/>
+        </p:nvCxnSpPr>
+        <p:spPr>
+          <a:xfrm>
+            <a:off x="1968838" y="4182146"/>
+            <a:ext cx="0" cy="315888"/>
+          </a:xfrm>
+          <a:prstGeom prst="line">
+            <a:avLst/>
+          </a:prstGeom>
+          <a:ln>
+            <a:solidFill>
+              <a:schemeClr val="tx1"/>
+            </a:solidFill>
+            <a:headEnd type="none"/>
+            <a:tailEnd type="stealth"/>
+          </a:ln>
+        </p:spPr>
+        <p:style>
+          <a:lnRef idx="1">
+            <a:schemeClr val="accent1"/>
+          </a:lnRef>
+          <a:fillRef idx="0">
+            <a:schemeClr val="accent1"/>
+          </a:fillRef>
+          <a:effectRef idx="0">
+            <a:schemeClr val="accent1"/>
+          </a:effectRef>
+          <a:fontRef idx="minor">
+            <a:schemeClr val="tx1"/>
+          </a:fontRef>
+        </p:style>
+      </p:cxnSp>
+      <p:cxnSp>
+        <p:nvCxnSpPr>
+          <p:cNvPr id="352" name="Straight Connector 351"/>
+          <p:cNvCxnSpPr/>
+          <p:nvPr/>
+        </p:nvCxnSpPr>
+        <p:spPr>
+          <a:xfrm>
+            <a:off x="3701137" y="4181355"/>
+            <a:ext cx="0" cy="315888"/>
+          </a:xfrm>
+          <a:prstGeom prst="line">
+            <a:avLst/>
+          </a:prstGeom>
+          <a:ln>
+            <a:solidFill>
+              <a:schemeClr val="tx1"/>
+            </a:solidFill>
+            <a:headEnd type="none"/>
+            <a:tailEnd type="stealth"/>
+          </a:ln>
+        </p:spPr>
+        <p:style>
+          <a:lnRef idx="1">
+            <a:schemeClr val="accent1"/>
+          </a:lnRef>
+          <a:fillRef idx="0">
+            <a:schemeClr val="accent1"/>
+          </a:fillRef>
+          <a:effectRef idx="0">
+            <a:schemeClr val="accent1"/>
+          </a:effectRef>
+          <a:fontRef idx="minor">
+            <a:schemeClr val="tx1"/>
+          </a:fontRef>
+        </p:style>
+      </p:cxnSp>
+      <p:cxnSp>
+        <p:nvCxnSpPr>
+          <p:cNvPr id="353" name="Straight Connector 352"/>
+          <p:cNvCxnSpPr/>
+          <p:nvPr/>
+        </p:nvCxnSpPr>
+        <p:spPr>
+          <a:xfrm>
+            <a:off x="7448686" y="4173427"/>
+            <a:ext cx="0" cy="315888"/>
+          </a:xfrm>
+          <a:prstGeom prst="line">
+            <a:avLst/>
+          </a:prstGeom>
+          <a:ln>
+            <a:solidFill>
+              <a:schemeClr val="tx1"/>
+            </a:solidFill>
+            <a:headEnd type="none"/>
+            <a:tailEnd type="stealth"/>
+          </a:ln>
+        </p:spPr>
+        <p:style>
+          <a:lnRef idx="1">
+            <a:schemeClr val="accent1"/>
+          </a:lnRef>
+          <a:fillRef idx="0">
+            <a:schemeClr val="accent1"/>
+          </a:fillRef>
+          <a:effectRef idx="0">
+            <a:schemeClr val="accent1"/>
+          </a:effectRef>
+          <a:fontRef idx="minor">
+            <a:schemeClr val="tx1"/>
+          </a:fontRef>
+        </p:style>
+      </p:cxnSp>
+      <p:sp>
+        <p:nvSpPr>
+          <p:cNvPr id="356" name="Oval 355"/>
+          <p:cNvSpPr/>
+          <p:nvPr/>
+        </p:nvSpPr>
+        <p:spPr>
+          <a:xfrm>
+            <a:off x="7086656" y="3084015"/>
+            <a:ext cx="245660" cy="245660"/>
+          </a:xfrm>
+          <a:prstGeom prst="ellipse">
+            <a:avLst/>
+          </a:prstGeom>
+          <a:solidFill>
+            <a:schemeClr val="bg1"/>
+          </a:solidFill>
+          <a:ln w="9525">
+            <a:solidFill>
+              <a:schemeClr val="tx1"/>
+            </a:solidFill>
+          </a:ln>
+        </p:spPr>
+        <p:style>
+          <a:lnRef idx="2">
+            <a:schemeClr val="accent1">
+              <a:shade val="50000"/>
+            </a:schemeClr>
+          </a:lnRef>
+          <a:fillRef idx="1">
+            <a:schemeClr val="accent1"/>
+          </a:fillRef>
+          <a:effectRef idx="0">
+            <a:schemeClr val="accent1"/>
+          </a:effectRef>
+          <a:fontRef idx="minor">
+            <a:schemeClr val="lt1"/>
+          </a:fontRef>
+        </p:style>
+        <p:txBody>
+          <a:bodyPr rtlCol="0" anchor="ctr"/>
+          <a:lstStyle/>
+          <a:p>
+            <a:pPr algn="ctr"/>
+            <a:endParaRPr lang="en-GB"/>
+          </a:p>
+        </p:txBody>
+      </p:sp>
+      <p:cxnSp>
+        <p:nvCxnSpPr>
+          <p:cNvPr id="357" name="Straight Connector 356"/>
+          <p:cNvCxnSpPr>
+            <a:stCxn id="356" idx="1"/>
+            <a:endCxn id="356" idx="5"/>
+          </p:cNvCxnSpPr>
+          <p:nvPr/>
+        </p:nvCxnSpPr>
+        <p:spPr>
+          <a:xfrm rot="16200000" flipH="1">
+            <a:off x="7122632" y="3119991"/>
+            <a:ext cx="173708" cy="173708"/>
+          </a:xfrm>
+          <a:prstGeom prst="line">
+            <a:avLst/>
+          </a:prstGeom>
+          <a:ln w="12700">
+            <a:solidFill>
+              <a:schemeClr val="tx1"/>
+            </a:solidFill>
+          </a:ln>
+        </p:spPr>
+        <p:style>
+          <a:lnRef idx="1">
+            <a:schemeClr val="accent1"/>
+          </a:lnRef>
+          <a:fillRef idx="0">
+            <a:schemeClr val="accent1"/>
+          </a:fillRef>
+          <a:effectRef idx="0">
+            <a:schemeClr val="accent1"/>
+          </a:effectRef>
+          <a:fontRef idx="minor">
+            <a:schemeClr val="tx1"/>
+          </a:fontRef>
+        </p:style>
+      </p:cxnSp>
+      <p:cxnSp>
+        <p:nvCxnSpPr>
+          <p:cNvPr id="358" name="Straight Connector 357"/>
+          <p:cNvCxnSpPr>
+            <a:stCxn id="356" idx="7"/>
+            <a:endCxn id="356" idx="3"/>
+          </p:cNvCxnSpPr>
+          <p:nvPr/>
+        </p:nvCxnSpPr>
+        <p:spPr>
+          <a:xfrm rot="16200000" flipH="1" flipV="1">
+            <a:off x="7122632" y="3119991"/>
+            <a:ext cx="173708" cy="173708"/>
+          </a:xfrm>
+          <a:prstGeom prst="line">
+            <a:avLst/>
+          </a:prstGeom>
+          <a:ln w="12700">
+            <a:solidFill>
+              <a:schemeClr val="tx1"/>
+            </a:solidFill>
+          </a:ln>
+        </p:spPr>
+        <p:style>
+          <a:lnRef idx="1">
+            <a:schemeClr val="accent1"/>
+          </a:lnRef>
+          <a:fillRef idx="0">
+            <a:schemeClr val="accent1"/>
+          </a:fillRef>
+          <a:effectRef idx="0">
+            <a:schemeClr val="accent1"/>
+          </a:effectRef>
+          <a:fontRef idx="minor">
+            <a:schemeClr val="tx1"/>
+          </a:fontRef>
+        </p:style>
+      </p:cxnSp>
+      <p:sp>
+        <p:nvSpPr>
+          <p:cNvPr id="359" name="Rectangle 358"/>
+          <p:cNvSpPr/>
+          <p:nvPr/>
+        </p:nvSpPr>
+        <p:spPr>
+          <a:xfrm>
+            <a:off x="6528680" y="2352093"/>
+            <a:ext cx="533720" cy="216024"/>
+          </a:xfrm>
+          <a:prstGeom prst="rect">
+            <a:avLst/>
+          </a:prstGeom>
+          <a:solidFill>
+            <a:schemeClr val="bg1"/>
+          </a:solidFill>
+          <a:ln w="9525">
+            <a:solidFill>
+              <a:schemeClr val="tx1"/>
+            </a:solidFill>
+          </a:ln>
+        </p:spPr>
+        <p:style>
+          <a:lnRef idx="2">
+            <a:schemeClr val="accent1">
+              <a:shade val="50000"/>
+            </a:schemeClr>
+          </a:lnRef>
+          <a:fillRef idx="1">
+            <a:schemeClr val="accent1"/>
+          </a:fillRef>
+          <a:effectRef idx="0">
+            <a:schemeClr val="accent1"/>
+          </a:effectRef>
+          <a:fontRef idx="minor">
+            <a:schemeClr val="lt1"/>
+          </a:fontRef>
+        </p:style>
+        <p:txBody>
+          <a:bodyPr rtlCol="0" anchor="ctr"/>
+          <a:lstStyle/>
+          <a:p>
+            <a:pPr algn="ctr"/>
+            <a:endParaRPr lang="en-GB"/>
+          </a:p>
+        </p:txBody>
+      </p:sp>
+      <p:sp>
+        <p:nvSpPr>
+          <p:cNvPr id="360" name="TextBox 359"/>
+          <p:cNvSpPr txBox="1"/>
+          <p:nvPr/>
+        </p:nvSpPr>
+        <p:spPr>
+          <a:xfrm>
+            <a:off x="6625184" y="2303152"/>
+            <a:ext cx="369012" cy="307777"/>
+          </a:xfrm>
+          <a:prstGeom prst="rect">
+            <a:avLst/>
+          </a:prstGeom>
+          <a:noFill/>
+        </p:spPr>
+        <p:txBody>
+          <a:bodyPr wrap="none" rtlCol="0">
+            <a:spAutoFit/>
+          </a:bodyPr>
+          <a:lstStyle/>
+          <a:p>
+            <a:r>
+              <a:rPr lang="en-US" sz="1400" dirty="0" smtClean="0"/>
+              <a:t>z</a:t>
+            </a:r>
+            <a:r>
+              <a:rPr lang="en-US" sz="1400" baseline="30000" dirty="0" smtClean="0"/>
+              <a:t>-N</a:t>
+            </a:r>
+            <a:endParaRPr lang="en-GB" sz="1400" baseline="30000" dirty="0"/>
+          </a:p>
+        </p:txBody>
+      </p:sp>
+      <p:cxnSp>
+        <p:nvCxnSpPr>
+          <p:cNvPr id="361" name="Elbow Connector 10"/>
+          <p:cNvCxnSpPr>
+            <a:stCxn id="356" idx="6"/>
+            <a:endCxn id="365" idx="0"/>
+          </p:cNvCxnSpPr>
+          <p:nvPr/>
+        </p:nvCxnSpPr>
+        <p:spPr>
+          <a:xfrm>
+            <a:off x="7332316" y="3206845"/>
+            <a:ext cx="116370" cy="582358"/>
+          </a:xfrm>
+          <a:prstGeom prst="bentConnector2">
+            <a:avLst/>
+          </a:prstGeom>
+          <a:ln>
+            <a:solidFill>
+              <a:schemeClr val="tx1"/>
+            </a:solidFill>
+            <a:tailEnd type="stealth"/>
+          </a:ln>
+        </p:spPr>
+        <p:style>
+          <a:lnRef idx="1">
+            <a:schemeClr val="accent1"/>
+          </a:lnRef>
+          <a:fillRef idx="0">
+            <a:schemeClr val="accent1"/>
+          </a:fillRef>
+          <a:effectRef idx="0">
+            <a:schemeClr val="accent1"/>
+          </a:effectRef>
+          <a:fontRef idx="minor">
+            <a:schemeClr val="tx1"/>
+          </a:fontRef>
+        </p:style>
+      </p:cxnSp>
+      <p:sp>
+        <p:nvSpPr>
+          <p:cNvPr id="363" name="Rectangle 362"/>
+          <p:cNvSpPr/>
+          <p:nvPr/>
+        </p:nvSpPr>
+        <p:spPr>
+          <a:xfrm>
+            <a:off x="6230294" y="1878021"/>
+            <a:ext cx="1462255" cy="2438735"/>
+          </a:xfrm>
+          <a:prstGeom prst="rect">
+            <a:avLst/>
+          </a:prstGeom>
+          <a:noFill/>
+          <a:ln w="12700" cap="rnd">
+            <a:solidFill>
+              <a:schemeClr val="accent2">
+                <a:lumMod val="75000"/>
+              </a:schemeClr>
+            </a:solidFill>
+            <a:prstDash val="lgDash"/>
+          </a:ln>
+        </p:spPr>
+        <p:style>
+          <a:lnRef idx="2">
+            <a:schemeClr val="accent1">
+              <a:shade val="50000"/>
+            </a:schemeClr>
+          </a:lnRef>
+          <a:fillRef idx="1">
+            <a:schemeClr val="accent1"/>
+          </a:fillRef>
+          <a:effectRef idx="0">
+            <a:schemeClr val="accent1"/>
+          </a:effectRef>
+          <a:fontRef idx="minor">
+            <a:schemeClr val="lt1"/>
+          </a:fontRef>
+        </p:style>
+        <p:txBody>
+          <a:bodyPr rtlCol="0" anchor="ctr"/>
+          <a:lstStyle/>
+          <a:p>
+            <a:pPr algn="ctr"/>
+            <a:endParaRPr lang="en-GB"/>
+          </a:p>
+        </p:txBody>
+      </p:sp>
+      <p:sp>
+        <p:nvSpPr>
+          <p:cNvPr id="364" name="TextBox 363"/>
+          <p:cNvSpPr txBox="1"/>
+          <p:nvPr/>
+        </p:nvSpPr>
+        <p:spPr>
+          <a:xfrm>
+            <a:off x="7300985" y="3822283"/>
+            <a:ext cx="301686" cy="400110"/>
+          </a:xfrm>
+          <a:prstGeom prst="rect">
+            <a:avLst/>
+          </a:prstGeom>
+          <a:noFill/>
+        </p:spPr>
+        <p:txBody>
+          <a:bodyPr wrap="none" rtlCol="0">
+            <a:spAutoFit/>
+          </a:bodyPr>
+          <a:lstStyle/>
+          <a:p>
+            <a:r>
+              <a:rPr lang="el-GR" sz="2000" dirty="0" smtClean="0"/>
+              <a:t>Σ</a:t>
+            </a:r>
+            <a:endParaRPr lang="en-GB" sz="2000" dirty="0"/>
+          </a:p>
+        </p:txBody>
+      </p:sp>
+      <p:sp>
+        <p:nvSpPr>
+          <p:cNvPr id="365" name="TextBox 364"/>
+          <p:cNvSpPr txBox="1"/>
+          <p:nvPr/>
+        </p:nvSpPr>
+        <p:spPr>
+          <a:xfrm>
+            <a:off x="7323491" y="3789203"/>
+            <a:ext cx="250390" cy="215444"/>
+          </a:xfrm>
+          <a:prstGeom prst="rect">
+            <a:avLst/>
+          </a:prstGeom>
+          <a:noFill/>
+        </p:spPr>
+        <p:txBody>
+          <a:bodyPr wrap="none" rtlCol="0">
+            <a:spAutoFit/>
+          </a:bodyPr>
+          <a:lstStyle/>
+          <a:p>
+            <a:r>
+              <a:rPr lang="en-US" sz="800" dirty="0" smtClean="0"/>
+              <a:t>N</a:t>
+            </a:r>
+            <a:endParaRPr lang="en-GB" sz="800" dirty="0"/>
+          </a:p>
+        </p:txBody>
+      </p:sp>
+      <p:cxnSp>
+        <p:nvCxnSpPr>
+          <p:cNvPr id="366" name="Straight Connector 365"/>
+          <p:cNvCxnSpPr>
+            <a:stCxn id="356" idx="2"/>
+          </p:cNvCxnSpPr>
+          <p:nvPr/>
+        </p:nvCxnSpPr>
+        <p:spPr>
+          <a:xfrm flipH="1" flipV="1">
+            <a:off x="6561601" y="3206838"/>
+            <a:ext cx="525055" cy="7"/>
+          </a:xfrm>
+          <a:prstGeom prst="line">
+            <a:avLst/>
+          </a:prstGeom>
+          <a:ln>
+            <a:solidFill>
+              <a:schemeClr val="tx1"/>
+            </a:solidFill>
+            <a:headEnd type="stealth"/>
+            <a:tailEnd type="oval"/>
+          </a:ln>
+        </p:spPr>
+        <p:style>
+          <a:lnRef idx="1">
+            <a:schemeClr val="accent1"/>
+          </a:lnRef>
+          <a:fillRef idx="0">
+            <a:schemeClr val="accent1"/>
+          </a:fillRef>
+          <a:effectRef idx="0">
+            <a:schemeClr val="accent1"/>
+          </a:effectRef>
+          <a:fontRef idx="minor">
+            <a:schemeClr val="tx1"/>
+          </a:fontRef>
+        </p:style>
+      </p:cxnSp>
+      <p:cxnSp>
+        <p:nvCxnSpPr>
+          <p:cNvPr id="367" name="Straight Connector 366"/>
+          <p:cNvCxnSpPr/>
+          <p:nvPr/>
+        </p:nvCxnSpPr>
+        <p:spPr>
+          <a:xfrm flipV="1">
+            <a:off x="6407862" y="3293699"/>
+            <a:ext cx="0" cy="230292"/>
+          </a:xfrm>
+          <a:prstGeom prst="line">
+            <a:avLst/>
+          </a:prstGeom>
+          <a:ln>
+            <a:solidFill>
+              <a:schemeClr val="tx1"/>
+            </a:solidFill>
+            <a:tailEnd type="oval"/>
+          </a:ln>
+        </p:spPr>
+        <p:style>
+          <a:lnRef idx="1">
+            <a:schemeClr val="accent1"/>
+          </a:lnRef>
+          <a:fillRef idx="0">
+            <a:schemeClr val="accent1"/>
+          </a:fillRef>
+          <a:effectRef idx="0">
+            <a:schemeClr val="accent1"/>
+          </a:effectRef>
+          <a:fontRef idx="minor">
+            <a:schemeClr val="tx1"/>
+          </a:fontRef>
+        </p:style>
+      </p:cxnSp>
+      <p:cxnSp>
+        <p:nvCxnSpPr>
+          <p:cNvPr id="368" name="Straight Connector 367"/>
+          <p:cNvCxnSpPr/>
+          <p:nvPr/>
+        </p:nvCxnSpPr>
+        <p:spPr>
+          <a:xfrm>
+            <a:off x="6407862" y="2118119"/>
+            <a:ext cx="0" cy="1001873"/>
+          </a:xfrm>
+          <a:prstGeom prst="line">
+            <a:avLst/>
+          </a:prstGeom>
+          <a:ln>
+            <a:solidFill>
+              <a:schemeClr val="tx1"/>
+            </a:solidFill>
+            <a:tailEnd type="oval"/>
+          </a:ln>
+        </p:spPr>
+        <p:style>
+          <a:lnRef idx="1">
+            <a:schemeClr val="accent1"/>
+          </a:lnRef>
+          <a:fillRef idx="0">
+            <a:schemeClr val="accent1"/>
+          </a:fillRef>
+          <a:effectRef idx="0">
+            <a:schemeClr val="accent1"/>
+          </a:effectRef>
+          <a:fontRef idx="minor">
+            <a:schemeClr val="tx1"/>
+          </a:fontRef>
+        </p:style>
+      </p:cxnSp>
+      <p:cxnSp>
+        <p:nvCxnSpPr>
+          <p:cNvPr id="369" name="Straight Connector 368"/>
+          <p:cNvCxnSpPr/>
+          <p:nvPr/>
+        </p:nvCxnSpPr>
+        <p:spPr>
+          <a:xfrm flipH="1">
+            <a:off x="6407862" y="3206838"/>
+            <a:ext cx="140371" cy="86862"/>
+          </a:xfrm>
+          <a:prstGeom prst="line">
+            <a:avLst/>
+          </a:prstGeom>
+          <a:ln>
+            <a:solidFill>
+              <a:schemeClr val="tx1"/>
+            </a:solidFill>
+            <a:tailEnd type="none"/>
+          </a:ln>
+        </p:spPr>
+        <p:style>
+          <a:lnRef idx="1">
+            <a:schemeClr val="accent1"/>
+          </a:lnRef>
+          <a:fillRef idx="0">
+            <a:schemeClr val="accent1"/>
+          </a:fillRef>
+          <a:effectRef idx="0">
+            <a:schemeClr val="accent1"/>
+          </a:effectRef>
+          <a:fontRef idx="minor">
+            <a:schemeClr val="tx1"/>
+          </a:fontRef>
+        </p:style>
+      </p:cxnSp>
+      <p:sp>
+        <p:nvSpPr>
+          <p:cNvPr id="370" name="Circular Arrow 369"/>
+          <p:cNvSpPr/>
+          <p:nvPr/>
+        </p:nvSpPr>
+        <p:spPr>
+          <a:xfrm rot="16200000">
+            <a:off x="6213992" y="3115606"/>
+            <a:ext cx="254060" cy="190860"/>
+          </a:xfrm>
+          <a:prstGeom prst="circularArrow">
+            <a:avLst>
+              <a:gd name="adj1" fmla="val 0"/>
+              <a:gd name="adj2" fmla="val 893028"/>
+              <a:gd name="adj3" fmla="val 20614661"/>
+              <a:gd name="adj4" fmla="val 10800000"/>
+              <a:gd name="adj5" fmla="val 8324"/>
+            </a:avLst>
+          </a:prstGeom>
+          <a:solidFill>
+            <a:schemeClr val="tx1"/>
+          </a:solidFill>
+          <a:ln w="9525" cmpd="sng">
+            <a:solidFill>
+              <a:schemeClr val="tx1"/>
+            </a:solidFill>
+          </a:ln>
+          <a:effectLst/>
+        </p:spPr>
+        <p:style>
+          <a:lnRef idx="1">
+            <a:schemeClr val="accent1"/>
+          </a:lnRef>
+          <a:fillRef idx="3">
+            <a:schemeClr val="accent1"/>
+          </a:fillRef>
+          <a:effectRef idx="2">
+            <a:schemeClr val="accent1"/>
+          </a:effectRef>
+          <a:fontRef idx="minor">
+            <a:schemeClr val="lt1"/>
+          </a:fontRef>
+        </p:style>
+        <p:txBody>
+          <a:bodyPr rtlCol="0" anchor="ctr"/>
+          <a:lstStyle/>
+          <a:p>
+            <a:pPr algn="ctr"/>
+            <a:endParaRPr lang="en-US">
+              <a:solidFill>
+                <a:schemeClr val="tx1"/>
+              </a:solidFill>
+            </a:endParaRPr>
+          </a:p>
+        </p:txBody>
+      </p:sp>
+      <p:cxnSp>
+        <p:nvCxnSpPr>
+          <p:cNvPr id="371" name="Straight Connector 370"/>
+          <p:cNvCxnSpPr>
+            <a:endCxn id="356" idx="0"/>
+          </p:cNvCxnSpPr>
+          <p:nvPr/>
+        </p:nvCxnSpPr>
+        <p:spPr>
+          <a:xfrm flipH="1">
+            <a:off x="7209486" y="2460105"/>
+            <a:ext cx="5314" cy="623910"/>
+          </a:xfrm>
+          <a:prstGeom prst="line">
+            <a:avLst/>
+          </a:prstGeom>
+          <a:ln>
+            <a:solidFill>
+              <a:schemeClr val="tx1"/>
+            </a:solidFill>
+            <a:tailEnd type="stealth"/>
+          </a:ln>
+        </p:spPr>
+        <p:style>
+          <a:lnRef idx="1">
+            <a:schemeClr val="accent1"/>
+          </a:lnRef>
+          <a:fillRef idx="0">
+            <a:schemeClr val="accent1"/>
+          </a:fillRef>
+          <a:effectRef idx="0">
+            <a:schemeClr val="accent1"/>
+          </a:effectRef>
+          <a:fontRef idx="minor">
+            <a:schemeClr val="tx1"/>
+          </a:fontRef>
+        </p:style>
+      </p:cxnSp>
+      <p:sp>
+        <p:nvSpPr>
+          <p:cNvPr id="372" name="Rectangle 371"/>
+          <p:cNvSpPr/>
+          <p:nvPr/>
+        </p:nvSpPr>
+        <p:spPr>
+          <a:xfrm>
+            <a:off x="7286668" y="3804095"/>
+            <a:ext cx="324036" cy="369332"/>
+          </a:xfrm>
+          <a:prstGeom prst="rect">
+            <a:avLst/>
+          </a:prstGeom>
+          <a:noFill/>
+          <a:ln w="9525">
+            <a:solidFill>
+              <a:schemeClr val="tx1"/>
+            </a:solidFill>
+          </a:ln>
+        </p:spPr>
+        <p:style>
+          <a:lnRef idx="2">
+            <a:schemeClr val="accent1">
+              <a:shade val="50000"/>
+            </a:schemeClr>
+          </a:lnRef>
+          <a:fillRef idx="1">
+            <a:schemeClr val="accent1"/>
+          </a:fillRef>
+          <a:effectRef idx="0">
+            <a:schemeClr val="accent1"/>
+          </a:effectRef>
+          <a:fontRef idx="minor">
+            <a:schemeClr val="lt1"/>
+          </a:fontRef>
+        </p:style>
+        <p:txBody>
+          <a:bodyPr rtlCol="0" anchor="ctr"/>
+          <a:lstStyle/>
+          <a:p>
+            <a:pPr algn="ctr"/>
+            <a:endParaRPr lang="en-GB"/>
+          </a:p>
+        </p:txBody>
+      </p:sp>
+      <p:cxnSp>
+        <p:nvCxnSpPr>
+          <p:cNvPr id="375" name="Straight Connector 374"/>
+          <p:cNvCxnSpPr/>
+          <p:nvPr/>
+        </p:nvCxnSpPr>
+        <p:spPr>
+          <a:xfrm>
+            <a:off x="6230294" y="2124803"/>
+            <a:ext cx="177568" cy="1"/>
+          </a:xfrm>
+          <a:prstGeom prst="line">
+            <a:avLst/>
+          </a:prstGeom>
+          <a:ln>
+            <a:solidFill>
+              <a:schemeClr val="tx1"/>
+            </a:solidFill>
+            <a:headEnd type="none"/>
+            <a:tailEnd type="none"/>
+          </a:ln>
+        </p:spPr>
+        <p:style>
+          <a:lnRef idx="1">
+            <a:schemeClr val="accent1"/>
+          </a:lnRef>
+          <a:fillRef idx="0">
+            <a:schemeClr val="accent1"/>
+          </a:fillRef>
+          <a:effectRef idx="0">
+            <a:schemeClr val="accent1"/>
+          </a:effectRef>
+          <a:fontRef idx="minor">
+            <a:schemeClr val="tx1"/>
+          </a:fontRef>
+        </p:style>
+      </p:cxnSp>
+      <p:cxnSp>
+        <p:nvCxnSpPr>
+          <p:cNvPr id="378" name="Straight Connector 377"/>
+          <p:cNvCxnSpPr>
+            <a:endCxn id="359" idx="1"/>
+          </p:cNvCxnSpPr>
+          <p:nvPr/>
+        </p:nvCxnSpPr>
+        <p:spPr>
+          <a:xfrm flipV="1">
+            <a:off x="6230294" y="2460105"/>
+            <a:ext cx="298386" cy="1"/>
+          </a:xfrm>
+          <a:prstGeom prst="line">
+            <a:avLst/>
+          </a:prstGeom>
+          <a:ln>
+            <a:solidFill>
+              <a:schemeClr val="tx1"/>
+            </a:solidFill>
+            <a:tailEnd type="stealth"/>
+          </a:ln>
+        </p:spPr>
+        <p:style>
+          <a:lnRef idx="1">
+            <a:schemeClr val="accent1"/>
+          </a:lnRef>
+          <a:fillRef idx="0">
+            <a:schemeClr val="accent1"/>
+          </a:fillRef>
+          <a:effectRef idx="0">
+            <a:schemeClr val="accent1"/>
+          </a:effectRef>
+          <a:fontRef idx="minor">
+            <a:schemeClr val="tx1"/>
+          </a:fontRef>
+        </p:style>
+      </p:cxnSp>
+      <p:cxnSp>
+        <p:nvCxnSpPr>
+          <p:cNvPr id="381" name="Straight Connector 380"/>
+          <p:cNvCxnSpPr/>
+          <p:nvPr/>
+        </p:nvCxnSpPr>
+        <p:spPr>
+          <a:xfrm>
+            <a:off x="6238546" y="3521878"/>
+            <a:ext cx="177568" cy="1"/>
+          </a:xfrm>
+          <a:prstGeom prst="line">
+            <a:avLst/>
+          </a:prstGeom>
+          <a:ln>
+            <a:solidFill>
+              <a:schemeClr val="tx1"/>
+            </a:solidFill>
+            <a:headEnd type="none"/>
+            <a:tailEnd type="none"/>
+          </a:ln>
+        </p:spPr>
+        <p:style>
+          <a:lnRef idx="1">
+            <a:schemeClr val="accent1"/>
+          </a:lnRef>
+          <a:fillRef idx="0">
+            <a:schemeClr val="accent1"/>
+          </a:fillRef>
+          <a:effectRef idx="0">
+            <a:schemeClr val="accent1"/>
+          </a:effectRef>
+          <a:fontRef idx="minor">
+            <a:schemeClr val="tx1"/>
+          </a:fontRef>
+        </p:style>
+      </p:cxnSp>
+      <p:cxnSp>
+        <p:nvCxnSpPr>
+          <p:cNvPr id="383" name="Straight Connector 382"/>
+          <p:cNvCxnSpPr/>
+          <p:nvPr/>
+        </p:nvCxnSpPr>
+        <p:spPr>
+          <a:xfrm flipH="1" flipV="1">
+            <a:off x="2814052" y="3206845"/>
+            <a:ext cx="525055" cy="7"/>
+          </a:xfrm>
+          <a:prstGeom prst="line">
+            <a:avLst/>
+          </a:prstGeom>
+          <a:ln>
+            <a:solidFill>
+              <a:schemeClr val="tx1"/>
+            </a:solidFill>
+            <a:headEnd type="stealth"/>
+            <a:tailEnd type="oval"/>
+          </a:ln>
+        </p:spPr>
+        <p:style>
+          <a:lnRef idx="1">
+            <a:schemeClr val="accent1"/>
+          </a:lnRef>
+          <a:fillRef idx="0">
+            <a:schemeClr val="accent1"/>
+          </a:fillRef>
+          <a:effectRef idx="0">
+            <a:schemeClr val="accent1"/>
+          </a:effectRef>
+          <a:fontRef idx="minor">
+            <a:schemeClr val="tx1"/>
+          </a:fontRef>
+        </p:style>
+      </p:cxnSp>
+    </p:spTree>
+    <p:extLst>
+      <p:ext uri="{BB962C8B-B14F-4D97-AF65-F5344CB8AC3E}">
+        <p14:creationId xmlns:p14="http://schemas.microsoft.com/office/powerpoint/2010/main" val="2487764683"/>
+      </p:ext>
+    </p:extLst>
+  </p:cSld>
+  <p:clrMapOvr>
+    <a:masterClrMapping/>
+  </p:clrMapOvr>
+  <p:timing>
+    <p:tnLst>
+      <p:par>
+        <p:cTn xmlns:p14="http://schemas.microsoft.com/office/powerpoint/2010/main" id="1" dur="indefinite" restart="never" nodeType="tmRoot"/>
+      </p:par>
+    </p:tnLst>
+  </p:timing>
 </p:sld>
 </file>
 

</xml_diff>

<commit_message>
Changed pipelined xengine diagram so that N is number of ants, and M is accumulation length
</commit_message>
<xml_diff>
--- a/papers/initial_report/graphics/instrument_diagrams.pptx
+++ b/papers/initial_report/graphics/instrument_diagrams.pptx
@@ -293,7 +293,7 @@
             <a:fld id="{00A040E2-248F-4AA9-A93C-939CA3D7B1E5}" type="datetimeFigureOut">
               <a:rPr lang="en-GB" smtClean="0"/>
               <a:pPr/>
-              <a:t>28/03/2012</a:t>
+              <a:t>17/04/2012</a:t>
             </a:fld>
             <a:endParaRPr lang="en-GB"/>
           </a:p>
@@ -460,7 +460,7 @@
             <a:fld id="{00A040E2-248F-4AA9-A93C-939CA3D7B1E5}" type="datetimeFigureOut">
               <a:rPr lang="en-GB" smtClean="0"/>
               <a:pPr/>
-              <a:t>28/03/2012</a:t>
+              <a:t>17/04/2012</a:t>
             </a:fld>
             <a:endParaRPr lang="en-GB"/>
           </a:p>
@@ -637,7 +637,7 @@
             <a:fld id="{00A040E2-248F-4AA9-A93C-939CA3D7B1E5}" type="datetimeFigureOut">
               <a:rPr lang="en-GB" smtClean="0"/>
               <a:pPr/>
-              <a:t>28/03/2012</a:t>
+              <a:t>17/04/2012</a:t>
             </a:fld>
             <a:endParaRPr lang="en-GB"/>
           </a:p>
@@ -804,7 +804,7 @@
             <a:fld id="{00A040E2-248F-4AA9-A93C-939CA3D7B1E5}" type="datetimeFigureOut">
               <a:rPr lang="en-GB" smtClean="0"/>
               <a:pPr/>
-              <a:t>28/03/2012</a:t>
+              <a:t>17/04/2012</a:t>
             </a:fld>
             <a:endParaRPr lang="en-GB"/>
           </a:p>
@@ -1047,7 +1047,7 @@
             <a:fld id="{00A040E2-248F-4AA9-A93C-939CA3D7B1E5}" type="datetimeFigureOut">
               <a:rPr lang="en-GB" smtClean="0"/>
               <a:pPr/>
-              <a:t>28/03/2012</a:t>
+              <a:t>17/04/2012</a:t>
             </a:fld>
             <a:endParaRPr lang="en-GB"/>
           </a:p>
@@ -1332,7 +1332,7 @@
             <a:fld id="{00A040E2-248F-4AA9-A93C-939CA3D7B1E5}" type="datetimeFigureOut">
               <a:rPr lang="en-GB" smtClean="0"/>
               <a:pPr/>
-              <a:t>28/03/2012</a:t>
+              <a:t>17/04/2012</a:t>
             </a:fld>
             <a:endParaRPr lang="en-GB"/>
           </a:p>
@@ -1751,7 +1751,7 @@
             <a:fld id="{00A040E2-248F-4AA9-A93C-939CA3D7B1E5}" type="datetimeFigureOut">
               <a:rPr lang="en-GB" smtClean="0"/>
               <a:pPr/>
-              <a:t>28/03/2012</a:t>
+              <a:t>17/04/2012</a:t>
             </a:fld>
             <a:endParaRPr lang="en-GB"/>
           </a:p>
@@ -1866,7 +1866,7 @@
             <a:fld id="{00A040E2-248F-4AA9-A93C-939CA3D7B1E5}" type="datetimeFigureOut">
               <a:rPr lang="en-GB" smtClean="0"/>
               <a:pPr/>
-              <a:t>28/03/2012</a:t>
+              <a:t>17/04/2012</a:t>
             </a:fld>
             <a:endParaRPr lang="en-GB"/>
           </a:p>
@@ -1958,7 +1958,7 @@
             <a:fld id="{00A040E2-248F-4AA9-A93C-939CA3D7B1E5}" type="datetimeFigureOut">
               <a:rPr lang="en-GB" smtClean="0"/>
               <a:pPr/>
-              <a:t>28/03/2012</a:t>
+              <a:t>17/04/2012</a:t>
             </a:fld>
             <a:endParaRPr lang="en-GB"/>
           </a:p>
@@ -2232,7 +2232,7 @@
             <a:fld id="{00A040E2-248F-4AA9-A93C-939CA3D7B1E5}" type="datetimeFigureOut">
               <a:rPr lang="en-GB" smtClean="0"/>
               <a:pPr/>
-              <a:t>28/03/2012</a:t>
+              <a:t>17/04/2012</a:t>
             </a:fld>
             <a:endParaRPr lang="en-GB"/>
           </a:p>
@@ -2482,7 +2482,7 @@
             <a:fld id="{00A040E2-248F-4AA9-A93C-939CA3D7B1E5}" type="datetimeFigureOut">
               <a:rPr lang="en-GB" smtClean="0"/>
               <a:pPr/>
-              <a:t>28/03/2012</a:t>
+              <a:t>17/04/2012</a:t>
             </a:fld>
             <a:endParaRPr lang="en-GB"/>
           </a:p>
@@ -2692,7 +2692,7 @@
             <a:fld id="{00A040E2-248F-4AA9-A93C-939CA3D7B1E5}" type="datetimeFigureOut">
               <a:rPr lang="en-GB" smtClean="0"/>
               <a:pPr/>
-              <a:t>28/03/2012</a:t>
+              <a:t>17/04/2012</a:t>
             </a:fld>
             <a:endParaRPr lang="en-GB"/>
           </a:p>
@@ -14710,7 +14710,7 @@
         <p:spPr>
           <a:xfrm>
             <a:off x="2877635" y="2311080"/>
-            <a:ext cx="369012" cy="307777"/>
+            <a:ext cx="394563" cy="307777"/>
           </a:xfrm>
           <a:prstGeom prst="rect">
             <a:avLst/>
@@ -14729,7 +14729,7 @@
             </a:r>
             <a:r>
               <a:rPr lang="en-US" sz="1400" baseline="30000" dirty="0" smtClean="0"/>
-              <a:t>-N</a:t>
+              <a:t>-M</a:t>
             </a:r>
             <a:endParaRPr lang="en-GB" sz="1400" baseline="30000" dirty="0"/>
           </a:p>
@@ -14785,7 +14785,7 @@
         <p:spPr>
           <a:xfrm>
             <a:off x="3584767" y="3214773"/>
-            <a:ext cx="116370" cy="582358"/>
+            <a:ext cx="128392" cy="582358"/>
           </a:xfrm>
           <a:prstGeom prst="bentConnector2">
             <a:avLst/>
@@ -15381,8 +15381,8 @@
         </p:nvSpPr>
         <p:spPr>
           <a:xfrm>
-            <a:off x="6501257" y="4587616"/>
-            <a:ext cx="1114408" cy="246221"/>
+            <a:off x="6514876" y="4587616"/>
+            <a:ext cx="1087169" cy="246221"/>
           </a:xfrm>
           <a:prstGeom prst="rect">
             <a:avLst/>
@@ -15402,7 +15402,23 @@
                 <a:ea typeface="Verdana" pitchFamily="34" charset="0"/>
                 <a:cs typeface="Verdana" pitchFamily="34" charset="0"/>
               </a:rPr>
-              <a:t>Cross Tap M/2</a:t>
+              <a:t>Cross Tap </a:t>
+            </a:r>
+            <a:r>
+              <a:rPr lang="en-US" sz="1000" dirty="0" smtClean="0">
+                <a:latin typeface="Verdana" pitchFamily="34" charset="0"/>
+                <a:ea typeface="Verdana" pitchFamily="34" charset="0"/>
+                <a:cs typeface="Verdana" pitchFamily="34" charset="0"/>
+              </a:rPr>
+              <a:t>N/</a:t>
+            </a:r>
+            <a:r>
+              <a:rPr lang="en-US" sz="1000" dirty="0" smtClean="0">
+                <a:latin typeface="Verdana" pitchFamily="34" charset="0"/>
+                <a:ea typeface="Verdana" pitchFamily="34" charset="0"/>
+                <a:cs typeface="Verdana" pitchFamily="34" charset="0"/>
+              </a:rPr>
+              <a:t>2</a:t>
             </a:r>
             <a:endParaRPr lang="en-GB" sz="1000" dirty="0">
               <a:latin typeface="Verdana" pitchFamily="34" charset="0"/>
@@ -15450,7 +15466,47 @@
                 <a:ea typeface="Verdana" pitchFamily="34" charset="0"/>
                 <a:cs typeface="Verdana" pitchFamily="34" charset="0"/>
               </a:rPr>
-              <a:t>  N time sample per antenna, M antennas</a:t>
+              <a:t>  </a:t>
+            </a:r>
+            <a:r>
+              <a:rPr lang="en-US" sz="1000" dirty="0" smtClean="0">
+                <a:latin typeface="Verdana" pitchFamily="34" charset="0"/>
+                <a:ea typeface="Verdana" pitchFamily="34" charset="0"/>
+                <a:cs typeface="Verdana" pitchFamily="34" charset="0"/>
+              </a:rPr>
+              <a:t>M </a:t>
+            </a:r>
+            <a:r>
+              <a:rPr lang="en-US" sz="1000" dirty="0" smtClean="0">
+                <a:latin typeface="Verdana" pitchFamily="34" charset="0"/>
+                <a:ea typeface="Verdana" pitchFamily="34" charset="0"/>
+                <a:cs typeface="Verdana" pitchFamily="34" charset="0"/>
+              </a:rPr>
+              <a:t>time sample per antenna, </a:t>
+            </a:r>
+            <a:r>
+              <a:rPr lang="en-US" sz="1000" dirty="0">
+                <a:latin typeface="Verdana" pitchFamily="34" charset="0"/>
+                <a:ea typeface="Verdana" pitchFamily="34" charset="0"/>
+                <a:cs typeface="Verdana" pitchFamily="34" charset="0"/>
+              </a:rPr>
+              <a:t>N</a:t>
+            </a:r>
+            <a:r>
+              <a:rPr lang="en-US" sz="1000" dirty="0" smtClean="0">
+                <a:latin typeface="Verdana" pitchFamily="34" charset="0"/>
+                <a:ea typeface="Verdana" pitchFamily="34" charset="0"/>
+                <a:cs typeface="Verdana" pitchFamily="34" charset="0"/>
+              </a:rPr>
+              <a:t> </a:t>
+            </a:r>
+            <a:r>
+              <a:rPr lang="en-US" sz="1000" dirty="0" smtClean="0">
+                <a:latin typeface="Verdana" pitchFamily="34" charset="0"/>
+                <a:ea typeface="Verdana" pitchFamily="34" charset="0"/>
+                <a:cs typeface="Verdana" pitchFamily="34" charset="0"/>
+              </a:rPr>
+              <a:t>antennas</a:t>
             </a:r>
             <a:endParaRPr lang="en-GB" sz="1000" dirty="0">
               <a:latin typeface="Verdana" pitchFamily="34" charset="0"/>
@@ -15469,7 +15525,7 @@
         <p:spPr>
           <a:xfrm>
             <a:off x="1842230" y="3796951"/>
-            <a:ext cx="250390" cy="215444"/>
+            <a:ext cx="274434" cy="215444"/>
           </a:xfrm>
           <a:prstGeom prst="rect">
             <a:avLst/>
@@ -15483,8 +15539,8 @@
           <a:lstStyle/>
           <a:p>
             <a:r>
-              <a:rPr lang="en-US" sz="800" dirty="0" smtClean="0"/>
-              <a:t>N</a:t>
+              <a:rPr lang="en-US" sz="800" dirty="0"/>
+              <a:t>M</a:t>
             </a:r>
             <a:endParaRPr lang="en-GB" sz="800" dirty="0"/>
           </a:p>
@@ -15529,7 +15585,7 @@
         <p:spPr>
           <a:xfrm>
             <a:off x="3575942" y="3797131"/>
-            <a:ext cx="250390" cy="215444"/>
+            <a:ext cx="274434" cy="215444"/>
           </a:xfrm>
           <a:prstGeom prst="rect">
             <a:avLst/>
@@ -15543,8 +15599,8 @@
           <a:lstStyle/>
           <a:p>
             <a:r>
-              <a:rPr lang="en-US" sz="800" dirty="0" smtClean="0"/>
-              <a:t>N</a:t>
+              <a:rPr lang="en-US" sz="800" dirty="0"/>
+              <a:t>M</a:t>
             </a:r>
             <a:endParaRPr lang="en-GB" sz="800" dirty="0"/>
           </a:p>
@@ -15626,7 +15682,19 @@
             </a:r>
             <a:r>
               <a:rPr lang="en-US" sz="1400" baseline="30000" dirty="0" smtClean="0"/>
-              <a:t>-(M/2)N</a:t>
+              <a:t>-(</a:t>
+            </a:r>
+            <a:r>
+              <a:rPr lang="en-US" sz="1400" baseline="30000" dirty="0" smtClean="0"/>
+              <a:t>M/</a:t>
+            </a:r>
+            <a:r>
+              <a:rPr lang="en-US" sz="1400" baseline="30000" dirty="0" smtClean="0"/>
+              <a:t>2</a:t>
+            </a:r>
+            <a:r>
+              <a:rPr lang="en-US" sz="1400" baseline="30000" dirty="0" smtClean="0"/>
+              <a:t>)N</a:t>
             </a:r>
             <a:endParaRPr lang="en-GB" sz="1400" baseline="30000" dirty="0"/>
           </a:p>
@@ -16350,7 +16418,7 @@
         <p:spPr>
           <a:xfrm>
             <a:off x="4384390" y="2313132"/>
-            <a:ext cx="369012" cy="307777"/>
+            <a:ext cx="394563" cy="307777"/>
           </a:xfrm>
           <a:prstGeom prst="rect">
             <a:avLst/>
@@ -16369,7 +16437,7 @@
             </a:r>
             <a:r>
               <a:rPr lang="en-US" sz="1400" baseline="30000" dirty="0" smtClean="0"/>
-              <a:t>-N</a:t>
+              <a:t>-M</a:t>
             </a:r>
             <a:endParaRPr lang="en-GB" sz="1400" baseline="30000" dirty="0"/>
           </a:p>
@@ -16387,7 +16455,7 @@
         <p:spPr>
           <a:xfrm>
             <a:off x="5091522" y="3216825"/>
-            <a:ext cx="116370" cy="582358"/>
+            <a:ext cx="128392" cy="582358"/>
           </a:xfrm>
           <a:prstGeom prst="bentConnector2">
             <a:avLst/>
@@ -16540,7 +16608,7 @@
         <p:spPr>
           <a:xfrm>
             <a:off x="5082697" y="3799183"/>
-            <a:ext cx="250390" cy="215444"/>
+            <a:ext cx="274434" cy="215444"/>
           </a:xfrm>
           <a:prstGeom prst="rect">
             <a:avLst/>
@@ -16554,8 +16622,8 @@
           <a:lstStyle/>
           <a:p>
             <a:r>
-              <a:rPr lang="en-US" sz="800" dirty="0" smtClean="0"/>
-              <a:t>N</a:t>
+              <a:rPr lang="en-US" sz="800" dirty="0"/>
+              <a:t>M</a:t>
             </a:r>
             <a:endParaRPr lang="en-GB" sz="800" dirty="0"/>
           </a:p>
@@ -17141,7 +17209,7 @@
         <p:spPr>
           <a:xfrm>
             <a:off x="6625184" y="2303152"/>
-            <a:ext cx="369012" cy="307777"/>
+            <a:ext cx="394563" cy="307777"/>
           </a:xfrm>
           <a:prstGeom prst="rect">
             <a:avLst/>
@@ -17160,7 +17228,7 @@
             </a:r>
             <a:r>
               <a:rPr lang="en-US" sz="1400" baseline="30000" dirty="0" smtClean="0"/>
-              <a:t>-N</a:t>
+              <a:t>-M</a:t>
             </a:r>
             <a:endParaRPr lang="en-GB" sz="1400" baseline="30000" dirty="0"/>
           </a:p>
@@ -17178,7 +17246,7 @@
         <p:spPr>
           <a:xfrm>
             <a:off x="7332316" y="3206845"/>
-            <a:ext cx="116370" cy="582358"/>
+            <a:ext cx="128392" cy="582358"/>
           </a:xfrm>
           <a:prstGeom prst="bentConnector2">
             <a:avLst/>
@@ -17293,7 +17361,7 @@
         <p:spPr>
           <a:xfrm>
             <a:off x="7323491" y="3789203"/>
-            <a:ext cx="250390" cy="215444"/>
+            <a:ext cx="274434" cy="215444"/>
           </a:xfrm>
           <a:prstGeom prst="rect">
             <a:avLst/>
@@ -17307,8 +17375,8 @@
           <a:lstStyle/>
           <a:p>
             <a:r>
-              <a:rPr lang="en-US" sz="800" dirty="0" smtClean="0"/>
-              <a:t>N</a:t>
+              <a:rPr lang="en-US" sz="800" dirty="0"/>
+              <a:t>M</a:t>
             </a:r>
             <a:endParaRPr lang="en-GB" sz="800" dirty="0"/>
           </a:p>

</xml_diff>